<commit_message>
Make AWS Control Tower optional
</commit_message>
<xml_diff>
--- a/aws_sra_examples/docs/artifacts/where-to-start-process.pptx
+++ b/aws_sra_examples/docs/artifacts/where-to-start-process.pptx
@@ -7,6 +7,7 @@
   <p:sldIdLst>
     <p:sldId id="256" r:id="rId2"/>
     <p:sldId id="257" r:id="rId3"/>
+    <p:sldId id="258" r:id="rId4"/>
   </p:sldIdLst>
   <p:sldSz cx="12192000" cy="6858000"/>
   <p:notesSz cx="6858000" cy="9144000"/>
@@ -106,6 +107,25 @@
     </a:lvl9pPr>
   </p:defaultTextStyle>
   <p:extLst>
+    <p:ext uri="{521415D9-36F7-43E2-AB2F-B90AF26B5E84}">
+      <p14:sectionLst xmlns:p14="http://schemas.microsoft.com/office/powerpoint/2010/main">
+        <p14:section name="AWS Control Tower - Manual" id="{9DEA3E99-5F59-4B17-B1AD-00E1B4727EEE}">
+          <p14:sldIdLst>
+            <p14:sldId id="256"/>
+          </p14:sldIdLst>
+        </p14:section>
+        <p14:section name="AWS Control Tower - Easy Setup" id="{62F7A3C2-1D45-41A1-8568-E19B39DC2A31}">
+          <p14:sldIdLst>
+            <p14:sldId id="257"/>
+          </p14:sldIdLst>
+        </p14:section>
+        <p14:section name="AWS Organizations - Manual/Easy" id="{CA4EFEBA-78AD-45C9-AD03-D8663D54CEF6}">
+          <p14:sldIdLst>
+            <p14:sldId id="258"/>
+          </p14:sldIdLst>
+        </p14:section>
+      </p14:sectionLst>
+    </p:ext>
     <p:ext uri="{EFAFB233-063F-42B5-8137-9DF3F51BA10A}">
       <p15:sldGuideLst xmlns:p15="http://schemas.microsoft.com/office/powerpoint/2012/main"/>
     </p:ext>
@@ -260,7 +280,7 @@
           <a:p>
             <a:fld id="{F7D36732-BBE1-AD4C-AB43-D93E4321E108}" type="datetimeFigureOut">
               <a:rPr lang="en-US" smtClean="0"/>
-              <a:t>5/2/2023</a:t>
+              <a:t>8/3/2023</a:t>
             </a:fld>
             <a:endParaRPr lang="en-US"/>
           </a:p>
@@ -458,7 +478,7 @@
           <a:p>
             <a:fld id="{F7D36732-BBE1-AD4C-AB43-D93E4321E108}" type="datetimeFigureOut">
               <a:rPr lang="en-US" smtClean="0"/>
-              <a:t>5/2/2023</a:t>
+              <a:t>8/3/2023</a:t>
             </a:fld>
             <a:endParaRPr lang="en-US"/>
           </a:p>
@@ -666,7 +686,7 @@
           <a:p>
             <a:fld id="{F7D36732-BBE1-AD4C-AB43-D93E4321E108}" type="datetimeFigureOut">
               <a:rPr lang="en-US" smtClean="0"/>
-              <a:t>5/2/2023</a:t>
+              <a:t>8/3/2023</a:t>
             </a:fld>
             <a:endParaRPr lang="en-US"/>
           </a:p>
@@ -864,7 +884,7 @@
           <a:p>
             <a:fld id="{F7D36732-BBE1-AD4C-AB43-D93E4321E108}" type="datetimeFigureOut">
               <a:rPr lang="en-US" smtClean="0"/>
-              <a:t>5/2/2023</a:t>
+              <a:t>8/3/2023</a:t>
             </a:fld>
             <a:endParaRPr lang="en-US"/>
           </a:p>
@@ -1139,7 +1159,7 @@
           <a:p>
             <a:fld id="{F7D36732-BBE1-AD4C-AB43-D93E4321E108}" type="datetimeFigureOut">
               <a:rPr lang="en-US" smtClean="0"/>
-              <a:t>5/2/2023</a:t>
+              <a:t>8/3/2023</a:t>
             </a:fld>
             <a:endParaRPr lang="en-US"/>
           </a:p>
@@ -1404,7 +1424,7 @@
           <a:p>
             <a:fld id="{F7D36732-BBE1-AD4C-AB43-D93E4321E108}" type="datetimeFigureOut">
               <a:rPr lang="en-US" smtClean="0"/>
-              <a:t>5/2/2023</a:t>
+              <a:t>8/3/2023</a:t>
             </a:fld>
             <a:endParaRPr lang="en-US"/>
           </a:p>
@@ -1816,7 +1836,7 @@
           <a:p>
             <a:fld id="{F7D36732-BBE1-AD4C-AB43-D93E4321E108}" type="datetimeFigureOut">
               <a:rPr lang="en-US" smtClean="0"/>
-              <a:t>5/2/2023</a:t>
+              <a:t>8/3/2023</a:t>
             </a:fld>
             <a:endParaRPr lang="en-US"/>
           </a:p>
@@ -1957,7 +1977,7 @@
           <a:p>
             <a:fld id="{F7D36732-BBE1-AD4C-AB43-D93E4321E108}" type="datetimeFigureOut">
               <a:rPr lang="en-US" smtClean="0"/>
-              <a:t>5/2/2023</a:t>
+              <a:t>8/3/2023</a:t>
             </a:fld>
             <a:endParaRPr lang="en-US"/>
           </a:p>
@@ -2070,7 +2090,7 @@
           <a:p>
             <a:fld id="{F7D36732-BBE1-AD4C-AB43-D93E4321E108}" type="datetimeFigureOut">
               <a:rPr lang="en-US" smtClean="0"/>
-              <a:t>5/2/2023</a:t>
+              <a:t>8/3/2023</a:t>
             </a:fld>
             <a:endParaRPr lang="en-US"/>
           </a:p>
@@ -2381,7 +2401,7 @@
           <a:p>
             <a:fld id="{F7D36732-BBE1-AD4C-AB43-D93E4321E108}" type="datetimeFigureOut">
               <a:rPr lang="en-US" smtClean="0"/>
-              <a:t>5/2/2023</a:t>
+              <a:t>8/3/2023</a:t>
             </a:fld>
             <a:endParaRPr lang="en-US"/>
           </a:p>
@@ -2669,7 +2689,7 @@
           <a:p>
             <a:fld id="{F7D36732-BBE1-AD4C-AB43-D93E4321E108}" type="datetimeFigureOut">
               <a:rPr lang="en-US" smtClean="0"/>
-              <a:t>5/2/2023</a:t>
+              <a:t>8/3/2023</a:t>
             </a:fld>
             <a:endParaRPr lang="en-US"/>
           </a:p>
@@ -2910,7 +2930,7 @@
           <a:p>
             <a:fld id="{F7D36732-BBE1-AD4C-AB43-D93E4321E108}" type="datetimeFigureOut">
               <a:rPr lang="en-US" smtClean="0"/>
-              <a:t>5/2/2023</a:t>
+              <a:t>8/3/2023</a:t>
             </a:fld>
             <a:endParaRPr lang="en-US"/>
           </a:p>
@@ -7431,6 +7451,3139 @@
 </p:sld>
 </file>
 
+<file path=ppt/slides/slide3.xml><?xml version="1.0" encoding="utf-8"?>
+<p:sld xmlns:a="http://schemas.openxmlformats.org/drawingml/2006/main" xmlns:r="http://schemas.openxmlformats.org/officeDocument/2006/relationships" xmlns:p="http://schemas.openxmlformats.org/presentationml/2006/main">
+  <p:cSld>
+    <p:spTree>
+      <p:nvGrpSpPr>
+        <p:cNvPr id="1" name=""/>
+        <p:cNvGrpSpPr/>
+        <p:nvPr/>
+      </p:nvGrpSpPr>
+      <p:grpSpPr>
+        <a:xfrm>
+          <a:off x="0" y="0"/>
+          <a:ext cx="0" cy="0"/>
+          <a:chOff x="0" y="0"/>
+          <a:chExt cx="0" cy="0"/>
+        </a:xfrm>
+      </p:grpSpPr>
+      <p:sp>
+        <p:nvSpPr>
+          <p:cNvPr id="71" name="Rectangle 70">
+            <a:extLst>
+              <a:ext uri="{FF2B5EF4-FFF2-40B4-BE49-F238E27FC236}">
+                <a16:creationId xmlns:a16="http://schemas.microsoft.com/office/drawing/2014/main" id="{267ED3D6-BBA8-7741-B91D-6CE70E65CEC2}"/>
+              </a:ext>
+            </a:extLst>
+          </p:cNvPr>
+          <p:cNvSpPr/>
+          <p:nvPr/>
+        </p:nvSpPr>
+        <p:spPr>
+          <a:xfrm>
+            <a:off x="1694101" y="504391"/>
+            <a:ext cx="9142775" cy="5609003"/>
+          </a:xfrm>
+          <a:prstGeom prst="rect">
+            <a:avLst/>
+          </a:prstGeom>
+          <a:solidFill>
+            <a:schemeClr val="bg1"/>
+          </a:solidFill>
+          <a:ln>
+            <a:solidFill>
+              <a:schemeClr val="tx1"/>
+            </a:solidFill>
+          </a:ln>
+        </p:spPr>
+        <p:style>
+          <a:lnRef idx="2">
+            <a:schemeClr val="accent1">
+              <a:shade val="50000"/>
+            </a:schemeClr>
+          </a:lnRef>
+          <a:fillRef idx="1">
+            <a:schemeClr val="accent1"/>
+          </a:fillRef>
+          <a:effectRef idx="0">
+            <a:schemeClr val="accent1"/>
+          </a:effectRef>
+          <a:fontRef idx="minor">
+            <a:schemeClr val="lt1"/>
+          </a:fontRef>
+        </p:style>
+        <p:txBody>
+          <a:bodyPr rtlCol="0" anchor="ctr"/>
+          <a:lstStyle/>
+          <a:p>
+            <a:pPr algn="ctr"/>
+            <a:endParaRPr lang="en-US"/>
+          </a:p>
+        </p:txBody>
+      </p:sp>
+      <p:sp>
+        <p:nvSpPr>
+          <p:cNvPr id="35" name="TextBox 34">
+            <a:extLst>
+              <a:ext uri="{FF2B5EF4-FFF2-40B4-BE49-F238E27FC236}">
+                <a16:creationId xmlns:a16="http://schemas.microsoft.com/office/drawing/2014/main" id="{86EAAF85-0A40-924B-84C6-9F4C81E67E10}"/>
+              </a:ext>
+            </a:extLst>
+          </p:cNvPr>
+          <p:cNvSpPr txBox="1"/>
+          <p:nvPr/>
+        </p:nvSpPr>
+        <p:spPr>
+          <a:xfrm>
+            <a:off x="2312696" y="1028811"/>
+            <a:ext cx="1983235" cy="338554"/>
+          </a:xfrm>
+          <a:prstGeom prst="rect">
+            <a:avLst/>
+          </a:prstGeom>
+          <a:noFill/>
+        </p:spPr>
+        <p:txBody>
+          <a:bodyPr wrap="square" rtlCol="0">
+            <a:spAutoFit/>
+          </a:bodyPr>
+          <a:lstStyle/>
+          <a:p>
+            <a:pPr algn="ctr"/>
+            <a:r>
+              <a:rPr lang="en-US" sz="1600" dirty="0"/>
+              <a:t>Setup Environment</a:t>
+            </a:r>
+          </a:p>
+        </p:txBody>
+      </p:sp>
+      <p:sp>
+        <p:nvSpPr>
+          <p:cNvPr id="37" name="TextBox 36">
+            <a:extLst>
+              <a:ext uri="{FF2B5EF4-FFF2-40B4-BE49-F238E27FC236}">
+                <a16:creationId xmlns:a16="http://schemas.microsoft.com/office/drawing/2014/main" id="{75E6BEDE-BFC3-7C4D-A11F-B7B194A3FB27}"/>
+              </a:ext>
+            </a:extLst>
+          </p:cNvPr>
+          <p:cNvSpPr txBox="1"/>
+          <p:nvPr/>
+        </p:nvSpPr>
+        <p:spPr>
+          <a:xfrm>
+            <a:off x="5032444" y="1033252"/>
+            <a:ext cx="2364603" cy="584775"/>
+          </a:xfrm>
+          <a:prstGeom prst="rect">
+            <a:avLst/>
+          </a:prstGeom>
+          <a:noFill/>
+        </p:spPr>
+        <p:txBody>
+          <a:bodyPr wrap="square" rtlCol="0">
+            <a:spAutoFit/>
+          </a:bodyPr>
+          <a:lstStyle/>
+          <a:p>
+            <a:pPr algn="ctr"/>
+            <a:r>
+              <a:rPr lang="en-US" sz="1600" dirty="0"/>
+              <a:t>Deploy Using CloudFormation</a:t>
+            </a:r>
+          </a:p>
+        </p:txBody>
+      </p:sp>
+      <p:sp>
+        <p:nvSpPr>
+          <p:cNvPr id="38" name="TextBox 37">
+            <a:extLst>
+              <a:ext uri="{FF2B5EF4-FFF2-40B4-BE49-F238E27FC236}">
+                <a16:creationId xmlns:a16="http://schemas.microsoft.com/office/drawing/2014/main" id="{2D12C6AF-BC9E-B344-853F-34BFA1F86B8C}"/>
+              </a:ext>
+            </a:extLst>
+          </p:cNvPr>
+          <p:cNvSpPr txBox="1"/>
+          <p:nvPr/>
+        </p:nvSpPr>
+        <p:spPr>
+          <a:xfrm>
+            <a:off x="8813421" y="1028811"/>
+            <a:ext cx="1584601" cy="338554"/>
+          </a:xfrm>
+          <a:prstGeom prst="rect">
+            <a:avLst/>
+          </a:prstGeom>
+          <a:noFill/>
+        </p:spPr>
+        <p:txBody>
+          <a:bodyPr wrap="none" rtlCol="0">
+            <a:spAutoFit/>
+          </a:bodyPr>
+          <a:lstStyle/>
+          <a:p>
+            <a:pPr algn="ctr"/>
+            <a:r>
+              <a:rPr lang="en-US" sz="1600" dirty="0"/>
+              <a:t>Deploy Solutions</a:t>
+            </a:r>
+          </a:p>
+        </p:txBody>
+      </p:sp>
+      <p:sp>
+        <p:nvSpPr>
+          <p:cNvPr id="44" name="Oval 43">
+            <a:extLst>
+              <a:ext uri="{FF2B5EF4-FFF2-40B4-BE49-F238E27FC236}">
+                <a16:creationId xmlns:a16="http://schemas.microsoft.com/office/drawing/2014/main" id="{644C2699-8CB8-F64C-9E4B-D804987590F0}"/>
+              </a:ext>
+            </a:extLst>
+          </p:cNvPr>
+          <p:cNvSpPr>
+            <a:spLocks noChangeAspect="1"/>
+          </p:cNvSpPr>
+          <p:nvPr/>
+        </p:nvSpPr>
+        <p:spPr>
+          <a:xfrm>
+            <a:off x="3083234" y="660125"/>
+            <a:ext cx="364331" cy="365760"/>
+          </a:xfrm>
+          <a:prstGeom prst="ellipse">
+            <a:avLst/>
+          </a:prstGeom>
+          <a:solidFill>
+            <a:schemeClr val="tx1"/>
+          </a:solidFill>
+          <a:ln>
+            <a:noFill/>
+          </a:ln>
+        </p:spPr>
+        <p:style>
+          <a:lnRef idx="2">
+            <a:schemeClr val="accent1">
+              <a:shade val="50000"/>
+            </a:schemeClr>
+          </a:lnRef>
+          <a:fillRef idx="1">
+            <a:schemeClr val="accent1"/>
+          </a:fillRef>
+          <a:effectRef idx="0">
+            <a:schemeClr val="accent1"/>
+          </a:effectRef>
+          <a:fontRef idx="minor">
+            <a:schemeClr val="lt1"/>
+          </a:fontRef>
+        </p:style>
+        <p:txBody>
+          <a:bodyPr rtlCol="0" anchor="ctr"/>
+          <a:lstStyle/>
+          <a:p>
+            <a:pPr algn="ctr"/>
+            <a:r>
+              <a:rPr lang="en-US" b="1" dirty="0"/>
+              <a:t>1</a:t>
+            </a:r>
+          </a:p>
+        </p:txBody>
+      </p:sp>
+      <p:sp>
+        <p:nvSpPr>
+          <p:cNvPr id="46" name="Oval 45">
+            <a:extLst>
+              <a:ext uri="{FF2B5EF4-FFF2-40B4-BE49-F238E27FC236}">
+                <a16:creationId xmlns:a16="http://schemas.microsoft.com/office/drawing/2014/main" id="{CBC98E2D-F2D6-DA48-A638-2FED40D8489A}"/>
+              </a:ext>
+            </a:extLst>
+          </p:cNvPr>
+          <p:cNvSpPr>
+            <a:spLocks noChangeAspect="1"/>
+          </p:cNvSpPr>
+          <p:nvPr/>
+        </p:nvSpPr>
+        <p:spPr>
+          <a:xfrm>
+            <a:off x="6033848" y="653784"/>
+            <a:ext cx="364331" cy="365760"/>
+          </a:xfrm>
+          <a:prstGeom prst="ellipse">
+            <a:avLst/>
+          </a:prstGeom>
+          <a:solidFill>
+            <a:schemeClr val="tx1"/>
+          </a:solidFill>
+          <a:ln>
+            <a:noFill/>
+          </a:ln>
+        </p:spPr>
+        <p:style>
+          <a:lnRef idx="2">
+            <a:schemeClr val="accent1">
+              <a:shade val="50000"/>
+            </a:schemeClr>
+          </a:lnRef>
+          <a:fillRef idx="1">
+            <a:schemeClr val="accent1"/>
+          </a:fillRef>
+          <a:effectRef idx="0">
+            <a:schemeClr val="accent1"/>
+          </a:effectRef>
+          <a:fontRef idx="minor">
+            <a:schemeClr val="lt1"/>
+          </a:fontRef>
+        </p:style>
+        <p:txBody>
+          <a:bodyPr rtlCol="0" anchor="ctr"/>
+          <a:lstStyle/>
+          <a:p>
+            <a:pPr algn="ctr"/>
+            <a:r>
+              <a:rPr lang="en-US" b="1" dirty="0"/>
+              <a:t>2</a:t>
+            </a:r>
+          </a:p>
+        </p:txBody>
+      </p:sp>
+      <p:sp>
+        <p:nvSpPr>
+          <p:cNvPr id="47" name="Oval 46">
+            <a:extLst>
+              <a:ext uri="{FF2B5EF4-FFF2-40B4-BE49-F238E27FC236}">
+                <a16:creationId xmlns:a16="http://schemas.microsoft.com/office/drawing/2014/main" id="{88F43977-C715-004D-A71F-491A017DF669}"/>
+              </a:ext>
+            </a:extLst>
+          </p:cNvPr>
+          <p:cNvSpPr>
+            <a:spLocks noChangeAspect="1"/>
+          </p:cNvSpPr>
+          <p:nvPr/>
+        </p:nvSpPr>
+        <p:spPr>
+          <a:xfrm>
+            <a:off x="9423543" y="660125"/>
+            <a:ext cx="364331" cy="365760"/>
+          </a:xfrm>
+          <a:prstGeom prst="ellipse">
+            <a:avLst/>
+          </a:prstGeom>
+          <a:solidFill>
+            <a:schemeClr val="tx1"/>
+          </a:solidFill>
+          <a:ln>
+            <a:noFill/>
+          </a:ln>
+        </p:spPr>
+        <p:style>
+          <a:lnRef idx="2">
+            <a:schemeClr val="accent1">
+              <a:shade val="50000"/>
+            </a:schemeClr>
+          </a:lnRef>
+          <a:fillRef idx="1">
+            <a:schemeClr val="accent1"/>
+          </a:fillRef>
+          <a:effectRef idx="0">
+            <a:schemeClr val="accent1"/>
+          </a:effectRef>
+          <a:fontRef idx="minor">
+            <a:schemeClr val="lt1"/>
+          </a:fontRef>
+        </p:style>
+        <p:txBody>
+          <a:bodyPr rtlCol="0" anchor="ctr"/>
+          <a:lstStyle/>
+          <a:p>
+            <a:pPr algn="ctr"/>
+            <a:r>
+              <a:rPr lang="en-US" b="1" dirty="0"/>
+              <a:t>3</a:t>
+            </a:r>
+          </a:p>
+        </p:txBody>
+      </p:sp>
+      <p:pic>
+        <p:nvPicPr>
+          <p:cNvPr id="66" name="Graphic 26">
+            <a:extLst>
+              <a:ext uri="{FF2B5EF4-FFF2-40B4-BE49-F238E27FC236}">
+                <a16:creationId xmlns:a16="http://schemas.microsoft.com/office/drawing/2014/main" id="{44626C93-8A7F-534C-98C0-D455CFC870D9}"/>
+              </a:ext>
+            </a:extLst>
+          </p:cNvPr>
+          <p:cNvPicPr>
+            <a:picLocks noChangeAspect="1" noChangeArrowheads="1"/>
+          </p:cNvPicPr>
+          <p:nvPr/>
+        </p:nvPicPr>
+        <p:blipFill>
+          <a:blip r:embed="rId2">
+            <a:extLst>
+              <a:ext uri="{28A0092B-C50C-407E-A947-70E740481C1C}">
+                <a14:useLocalDpi xmlns:a14="http://schemas.microsoft.com/office/drawing/2010/main" val="0"/>
+              </a:ext>
+            </a:extLst>
+          </a:blip>
+          <a:srcRect/>
+          <a:stretch>
+            <a:fillRect/>
+          </a:stretch>
+        </p:blipFill>
+        <p:spPr bwMode="auto">
+          <a:xfrm>
+            <a:off x="5716935" y="3251254"/>
+            <a:ext cx="457200" cy="457200"/>
+          </a:xfrm>
+          <a:prstGeom prst="rect">
+            <a:avLst/>
+          </a:prstGeom>
+          <a:noFill/>
+          <a:ln>
+            <a:noFill/>
+          </a:ln>
+          <a:extLst>
+            <a:ext uri="{909E8E84-426E-40DD-AFC4-6F175D3DCCD1}">
+              <a14:hiddenFill xmlns:a14="http://schemas.microsoft.com/office/drawing/2010/main">
+                <a:solidFill>
+                  <a:srgbClr val="FFFFFF"/>
+                </a:solidFill>
+              </a14:hiddenFill>
+            </a:ext>
+            <a:ext uri="{91240B29-F687-4F45-9708-019B960494DF}">
+              <a14:hiddenLine xmlns:a14="http://schemas.microsoft.com/office/drawing/2010/main" w="9525">
+                <a:solidFill>
+                  <a:srgbClr val="000000"/>
+                </a:solidFill>
+                <a:miter lim="800000"/>
+                <a:headEnd/>
+                <a:tailEnd/>
+              </a14:hiddenLine>
+            </a:ext>
+          </a:extLst>
+        </p:spPr>
+      </p:pic>
+      <p:pic>
+        <p:nvPicPr>
+          <p:cNvPr id="69" name="Graphic 21">
+            <a:extLst>
+              <a:ext uri="{FF2B5EF4-FFF2-40B4-BE49-F238E27FC236}">
+                <a16:creationId xmlns:a16="http://schemas.microsoft.com/office/drawing/2014/main" id="{BF27C033-CFCA-7D4C-B96F-63E8F38B77A9}"/>
+              </a:ext>
+            </a:extLst>
+          </p:cNvPr>
+          <p:cNvPicPr>
+            <a:picLocks noChangeAspect="1" noChangeArrowheads="1"/>
+          </p:cNvPicPr>
+          <p:nvPr/>
+        </p:nvPicPr>
+        <p:blipFill>
+          <a:blip r:embed="rId3">
+            <a:extLst>
+              <a:ext uri="{28A0092B-C50C-407E-A947-70E740481C1C}">
+                <a14:useLocalDpi xmlns:a14="http://schemas.microsoft.com/office/drawing/2010/main" val="0"/>
+              </a:ext>
+            </a:extLst>
+          </a:blip>
+          <a:srcRect/>
+          <a:stretch>
+            <a:fillRect/>
+          </a:stretch>
+        </p:blipFill>
+        <p:spPr bwMode="auto">
+          <a:xfrm>
+            <a:off x="5899626" y="2104337"/>
+            <a:ext cx="548640" cy="548640"/>
+          </a:xfrm>
+          <a:prstGeom prst="rect">
+            <a:avLst/>
+          </a:prstGeom>
+          <a:noFill/>
+          <a:ln>
+            <a:noFill/>
+          </a:ln>
+          <a:extLst>
+            <a:ext uri="{909E8E84-426E-40DD-AFC4-6F175D3DCCD1}">
+              <a14:hiddenFill xmlns:a14="http://schemas.microsoft.com/office/drawing/2010/main">
+                <a:solidFill>
+                  <a:srgbClr val="FFFFFF"/>
+                </a:solidFill>
+              </a14:hiddenFill>
+            </a:ext>
+            <a:ext uri="{91240B29-F687-4F45-9708-019B960494DF}">
+              <a14:hiddenLine xmlns:a14="http://schemas.microsoft.com/office/drawing/2010/main" w="9525">
+                <a:solidFill>
+                  <a:srgbClr val="000000"/>
+                </a:solidFill>
+                <a:miter lim="800000"/>
+                <a:headEnd/>
+                <a:tailEnd/>
+              </a14:hiddenLine>
+            </a:ext>
+          </a:extLst>
+        </p:spPr>
+      </p:pic>
+      <p:sp>
+        <p:nvSpPr>
+          <p:cNvPr id="70" name="TextBox 9">
+            <a:extLst>
+              <a:ext uri="{FF2B5EF4-FFF2-40B4-BE49-F238E27FC236}">
+                <a16:creationId xmlns:a16="http://schemas.microsoft.com/office/drawing/2014/main" id="{CB34C41A-C5D4-A849-8DE6-02C05510571A}"/>
+              </a:ext>
+            </a:extLst>
+          </p:cNvPr>
+          <p:cNvSpPr txBox="1">
+            <a:spLocks noChangeArrowheads="1"/>
+          </p:cNvSpPr>
+          <p:nvPr/>
+        </p:nvSpPr>
+        <p:spPr bwMode="auto">
+          <a:xfrm>
+            <a:off x="5526905" y="2657130"/>
+            <a:ext cx="1297877" cy="461665"/>
+          </a:xfrm>
+          <a:prstGeom prst="rect">
+            <a:avLst/>
+          </a:prstGeom>
+          <a:noFill/>
+          <a:ln>
+            <a:noFill/>
+          </a:ln>
+          <a:extLst>
+            <a:ext uri="{909E8E84-426E-40DD-AFC4-6F175D3DCCD1}">
+              <a14:hiddenFill xmlns:a14="http://schemas.microsoft.com/office/drawing/2010/main">
+                <a:solidFill>
+                  <a:srgbClr val="FFFFFF"/>
+                </a:solidFill>
+              </a14:hiddenFill>
+            </a:ext>
+            <a:ext uri="{91240B29-F687-4F45-9708-019B960494DF}">
+              <a14:hiddenLine xmlns:a14="http://schemas.microsoft.com/office/drawing/2010/main" w="9525">
+                <a:solidFill>
+                  <a:srgbClr val="000000"/>
+                </a:solidFill>
+                <a:miter lim="800000"/>
+                <a:headEnd/>
+                <a:tailEnd/>
+              </a14:hiddenLine>
+            </a:ext>
+          </a:extLst>
+        </p:spPr>
+        <p:txBody>
+          <a:bodyPr wrap="square">
+            <a:spAutoFit/>
+          </a:bodyPr>
+          <a:lstStyle>
+            <a:lvl1pPr>
+              <a:defRPr>
+                <a:solidFill>
+                  <a:schemeClr val="tx1"/>
+                </a:solidFill>
+                <a:latin typeface="Calibri" panose="020F0502020204030204" pitchFamily="34" charset="0"/>
+              </a:defRPr>
+            </a:lvl1pPr>
+            <a:lvl2pPr marL="742950" indent="-285750">
+              <a:defRPr>
+                <a:solidFill>
+                  <a:schemeClr val="tx1"/>
+                </a:solidFill>
+                <a:latin typeface="Calibri" panose="020F0502020204030204" pitchFamily="34" charset="0"/>
+              </a:defRPr>
+            </a:lvl2pPr>
+            <a:lvl3pPr marL="1143000" indent="-228600">
+              <a:defRPr>
+                <a:solidFill>
+                  <a:schemeClr val="tx1"/>
+                </a:solidFill>
+                <a:latin typeface="Calibri" panose="020F0502020204030204" pitchFamily="34" charset="0"/>
+              </a:defRPr>
+            </a:lvl3pPr>
+            <a:lvl4pPr marL="1600200" indent="-228600">
+              <a:defRPr>
+                <a:solidFill>
+                  <a:schemeClr val="tx1"/>
+                </a:solidFill>
+                <a:latin typeface="Calibri" panose="020F0502020204030204" pitchFamily="34" charset="0"/>
+              </a:defRPr>
+            </a:lvl4pPr>
+            <a:lvl5pPr marL="2057400" indent="-228600">
+              <a:defRPr>
+                <a:solidFill>
+                  <a:schemeClr val="tx1"/>
+                </a:solidFill>
+                <a:latin typeface="Calibri" panose="020F0502020204030204" pitchFamily="34" charset="0"/>
+              </a:defRPr>
+            </a:lvl5pPr>
+            <a:lvl6pPr marL="2514600" indent="-228600" eaLnBrk="0" fontAlgn="base" hangingPunct="0">
+              <a:spcBef>
+                <a:spcPct val="0"/>
+              </a:spcBef>
+              <a:spcAft>
+                <a:spcPct val="0"/>
+              </a:spcAft>
+              <a:defRPr>
+                <a:solidFill>
+                  <a:schemeClr val="tx1"/>
+                </a:solidFill>
+                <a:latin typeface="Calibri" panose="020F0502020204030204" pitchFamily="34" charset="0"/>
+              </a:defRPr>
+            </a:lvl6pPr>
+            <a:lvl7pPr marL="2971800" indent="-228600" eaLnBrk="0" fontAlgn="base" hangingPunct="0">
+              <a:spcBef>
+                <a:spcPct val="0"/>
+              </a:spcBef>
+              <a:spcAft>
+                <a:spcPct val="0"/>
+              </a:spcAft>
+              <a:defRPr>
+                <a:solidFill>
+                  <a:schemeClr val="tx1"/>
+                </a:solidFill>
+                <a:latin typeface="Calibri" panose="020F0502020204030204" pitchFamily="34" charset="0"/>
+              </a:defRPr>
+            </a:lvl7pPr>
+            <a:lvl8pPr marL="3429000" indent="-228600" eaLnBrk="0" fontAlgn="base" hangingPunct="0">
+              <a:spcBef>
+                <a:spcPct val="0"/>
+              </a:spcBef>
+              <a:spcAft>
+                <a:spcPct val="0"/>
+              </a:spcAft>
+              <a:defRPr>
+                <a:solidFill>
+                  <a:schemeClr val="tx1"/>
+                </a:solidFill>
+                <a:latin typeface="Calibri" panose="020F0502020204030204" pitchFamily="34" charset="0"/>
+              </a:defRPr>
+            </a:lvl8pPr>
+            <a:lvl9pPr marL="3886200" indent="-228600" eaLnBrk="0" fontAlgn="base" hangingPunct="0">
+              <a:spcBef>
+                <a:spcPct val="0"/>
+              </a:spcBef>
+              <a:spcAft>
+                <a:spcPct val="0"/>
+              </a:spcAft>
+              <a:defRPr>
+                <a:solidFill>
+                  <a:schemeClr val="tx1"/>
+                </a:solidFill>
+                <a:latin typeface="Calibri" panose="020F0502020204030204" pitchFamily="34" charset="0"/>
+              </a:defRPr>
+            </a:lvl9pPr>
+          </a:lstStyle>
+          <a:p>
+            <a:pPr algn="ctr" eaLnBrk="1" hangingPunct="1"/>
+            <a:r>
+              <a:rPr lang="en-US" altLang="en-US" sz="1200" dirty="0">
+                <a:latin typeface="Arial" panose="020B0604020202020204" pitchFamily="34" charset="0"/>
+                <a:ea typeface="Amazon Ember" panose="020B0603020204020204" pitchFamily="34" charset="0"/>
+                <a:cs typeface="Arial" panose="020B0604020202020204" pitchFamily="34" charset="0"/>
+              </a:rPr>
+              <a:t>AWS CloudFormation</a:t>
+            </a:r>
+          </a:p>
+        </p:txBody>
+      </p:sp>
+      <p:pic>
+        <p:nvPicPr>
+          <p:cNvPr id="53" name="Graphic 19">
+            <a:extLst>
+              <a:ext uri="{FF2B5EF4-FFF2-40B4-BE49-F238E27FC236}">
+                <a16:creationId xmlns:a16="http://schemas.microsoft.com/office/drawing/2014/main" id="{7BF2B0B6-BDA8-304B-ACE5-B41E43F42E86}"/>
+              </a:ext>
+            </a:extLst>
+          </p:cNvPr>
+          <p:cNvPicPr>
+            <a:picLocks noChangeAspect="1" noChangeArrowheads="1"/>
+          </p:cNvPicPr>
+          <p:nvPr/>
+        </p:nvPicPr>
+        <p:blipFill>
+          <a:blip r:embed="rId4">
+            <a:extLst>
+              <a:ext uri="{28A0092B-C50C-407E-A947-70E740481C1C}">
+                <a14:useLocalDpi xmlns:a14="http://schemas.microsoft.com/office/drawing/2010/main" val="0"/>
+              </a:ext>
+            </a:extLst>
+          </a:blip>
+          <a:srcRect/>
+          <a:stretch>
+            <a:fillRect/>
+          </a:stretch>
+        </p:blipFill>
+        <p:spPr bwMode="auto">
+          <a:xfrm>
+            <a:off x="9923114" y="1559967"/>
+            <a:ext cx="548640" cy="548640"/>
+          </a:xfrm>
+          <a:prstGeom prst="rect">
+            <a:avLst/>
+          </a:prstGeom>
+          <a:noFill/>
+          <a:ln>
+            <a:noFill/>
+          </a:ln>
+          <a:extLst>
+            <a:ext uri="{909E8E84-426E-40DD-AFC4-6F175D3DCCD1}">
+              <a14:hiddenFill xmlns:a14="http://schemas.microsoft.com/office/drawing/2010/main">
+                <a:solidFill>
+                  <a:srgbClr val="FFFFFF"/>
+                </a:solidFill>
+              </a14:hiddenFill>
+            </a:ext>
+            <a:ext uri="{91240B29-F687-4F45-9708-019B960494DF}">
+              <a14:hiddenLine xmlns:a14="http://schemas.microsoft.com/office/drawing/2010/main" w="9525">
+                <a:solidFill>
+                  <a:srgbClr val="000000"/>
+                </a:solidFill>
+                <a:miter lim="800000"/>
+                <a:headEnd/>
+                <a:tailEnd/>
+              </a14:hiddenLine>
+            </a:ext>
+          </a:extLst>
+        </p:spPr>
+      </p:pic>
+      <p:pic>
+        <p:nvPicPr>
+          <p:cNvPr id="59" name="Graphic 6">
+            <a:extLst>
+              <a:ext uri="{FF2B5EF4-FFF2-40B4-BE49-F238E27FC236}">
+                <a16:creationId xmlns:a16="http://schemas.microsoft.com/office/drawing/2014/main" id="{FBF4D34D-0EE5-9E4F-8252-5012EF8775F8}"/>
+              </a:ext>
+            </a:extLst>
+          </p:cNvPr>
+          <p:cNvPicPr>
+            <a:picLocks noChangeAspect="1" noChangeArrowheads="1"/>
+          </p:cNvPicPr>
+          <p:nvPr/>
+        </p:nvPicPr>
+        <p:blipFill>
+          <a:blip r:embed="rId5">
+            <a:extLst>
+              <a:ext uri="{28A0092B-C50C-407E-A947-70E740481C1C}">
+                <a14:useLocalDpi xmlns:a14="http://schemas.microsoft.com/office/drawing/2010/main" val="0"/>
+              </a:ext>
+            </a:extLst>
+          </a:blip>
+          <a:srcRect/>
+          <a:stretch>
+            <a:fillRect/>
+          </a:stretch>
+        </p:blipFill>
+        <p:spPr bwMode="auto">
+          <a:xfrm>
+            <a:off x="8826894" y="2651635"/>
+            <a:ext cx="548640" cy="548640"/>
+          </a:xfrm>
+          <a:prstGeom prst="rect">
+            <a:avLst/>
+          </a:prstGeom>
+          <a:noFill/>
+          <a:ln>
+            <a:noFill/>
+          </a:ln>
+          <a:extLst>
+            <a:ext uri="{909E8E84-426E-40DD-AFC4-6F175D3DCCD1}">
+              <a14:hiddenFill xmlns:a14="http://schemas.microsoft.com/office/drawing/2010/main">
+                <a:solidFill>
+                  <a:srgbClr val="FFFFFF"/>
+                </a:solidFill>
+              </a14:hiddenFill>
+            </a:ext>
+            <a:ext uri="{91240B29-F687-4F45-9708-019B960494DF}">
+              <a14:hiddenLine xmlns:a14="http://schemas.microsoft.com/office/drawing/2010/main" w="9525">
+                <a:solidFill>
+                  <a:srgbClr val="000000"/>
+                </a:solidFill>
+                <a:miter lim="800000"/>
+                <a:headEnd/>
+                <a:tailEnd/>
+              </a14:hiddenLine>
+            </a:ext>
+          </a:extLst>
+        </p:spPr>
+      </p:pic>
+      <p:pic>
+        <p:nvPicPr>
+          <p:cNvPr id="61" name="Graphic 17">
+            <a:extLst>
+              <a:ext uri="{FF2B5EF4-FFF2-40B4-BE49-F238E27FC236}">
+                <a16:creationId xmlns:a16="http://schemas.microsoft.com/office/drawing/2014/main" id="{AB92964A-5C30-F340-818E-7F03807DCC21}"/>
+              </a:ext>
+            </a:extLst>
+          </p:cNvPr>
+          <p:cNvPicPr>
+            <a:picLocks noChangeAspect="1" noChangeArrowheads="1"/>
+          </p:cNvPicPr>
+          <p:nvPr/>
+        </p:nvPicPr>
+        <p:blipFill>
+          <a:blip r:embed="rId6">
+            <a:extLst>
+              <a:ext uri="{28A0092B-C50C-407E-A947-70E740481C1C}">
+                <a14:useLocalDpi xmlns:a14="http://schemas.microsoft.com/office/drawing/2010/main" val="0"/>
+              </a:ext>
+            </a:extLst>
+          </a:blip>
+          <a:srcRect/>
+          <a:stretch>
+            <a:fillRect/>
+          </a:stretch>
+        </p:blipFill>
+        <p:spPr bwMode="auto">
+          <a:xfrm>
+            <a:off x="9377260" y="2108247"/>
+            <a:ext cx="548640" cy="548640"/>
+          </a:xfrm>
+          <a:prstGeom prst="rect">
+            <a:avLst/>
+          </a:prstGeom>
+          <a:noFill/>
+          <a:ln>
+            <a:noFill/>
+          </a:ln>
+          <a:extLst>
+            <a:ext uri="{909E8E84-426E-40DD-AFC4-6F175D3DCCD1}">
+              <a14:hiddenFill xmlns:a14="http://schemas.microsoft.com/office/drawing/2010/main">
+                <a:solidFill>
+                  <a:srgbClr val="FFFFFF"/>
+                </a:solidFill>
+              </a14:hiddenFill>
+            </a:ext>
+            <a:ext uri="{91240B29-F687-4F45-9708-019B960494DF}">
+              <a14:hiddenLine xmlns:a14="http://schemas.microsoft.com/office/drawing/2010/main" w="9525">
+                <a:solidFill>
+                  <a:srgbClr val="000000"/>
+                </a:solidFill>
+                <a:miter lim="800000"/>
+                <a:headEnd/>
+                <a:tailEnd/>
+              </a14:hiddenLine>
+            </a:ext>
+          </a:extLst>
+        </p:spPr>
+      </p:pic>
+      <p:pic>
+        <p:nvPicPr>
+          <p:cNvPr id="64" name="Graphic 19">
+            <a:extLst>
+              <a:ext uri="{FF2B5EF4-FFF2-40B4-BE49-F238E27FC236}">
+                <a16:creationId xmlns:a16="http://schemas.microsoft.com/office/drawing/2014/main" id="{D164B223-6E7B-6446-9247-DC12A51BBF2C}"/>
+              </a:ext>
+            </a:extLst>
+          </p:cNvPr>
+          <p:cNvPicPr>
+            <a:picLocks noChangeAspect="1" noChangeArrowheads="1"/>
+          </p:cNvPicPr>
+          <p:nvPr/>
+        </p:nvPicPr>
+        <p:blipFill>
+          <a:blip r:embed="rId7">
+            <a:extLst>
+              <a:ext uri="{28A0092B-C50C-407E-A947-70E740481C1C}">
+                <a14:useLocalDpi xmlns:a14="http://schemas.microsoft.com/office/drawing/2010/main" val="0"/>
+              </a:ext>
+            </a:extLst>
+          </a:blip>
+          <a:srcRect/>
+          <a:stretch>
+            <a:fillRect/>
+          </a:stretch>
+        </p:blipFill>
+        <p:spPr bwMode="auto">
+          <a:xfrm>
+            <a:off x="9923114" y="2651635"/>
+            <a:ext cx="548640" cy="548640"/>
+          </a:xfrm>
+          <a:prstGeom prst="rect">
+            <a:avLst/>
+          </a:prstGeom>
+          <a:noFill/>
+          <a:ln>
+            <a:noFill/>
+          </a:ln>
+          <a:extLst>
+            <a:ext uri="{909E8E84-426E-40DD-AFC4-6F175D3DCCD1}">
+              <a14:hiddenFill xmlns:a14="http://schemas.microsoft.com/office/drawing/2010/main">
+                <a:solidFill>
+                  <a:srgbClr val="FFFFFF"/>
+                </a:solidFill>
+              </a14:hiddenFill>
+            </a:ext>
+            <a:ext uri="{91240B29-F687-4F45-9708-019B960494DF}">
+              <a14:hiddenLine xmlns:a14="http://schemas.microsoft.com/office/drawing/2010/main" w="9525">
+                <a:solidFill>
+                  <a:srgbClr val="000000"/>
+                </a:solidFill>
+                <a:miter lim="800000"/>
+                <a:headEnd/>
+                <a:tailEnd/>
+              </a14:hiddenLine>
+            </a:ext>
+          </a:extLst>
+        </p:spPr>
+      </p:pic>
+      <p:pic>
+        <p:nvPicPr>
+          <p:cNvPr id="72" name="Graphic 8">
+            <a:extLst>
+              <a:ext uri="{FF2B5EF4-FFF2-40B4-BE49-F238E27FC236}">
+                <a16:creationId xmlns:a16="http://schemas.microsoft.com/office/drawing/2014/main" id="{3C5B7FBE-DB8D-E544-963A-43DEBF048400}"/>
+              </a:ext>
+            </a:extLst>
+          </p:cNvPr>
+          <p:cNvPicPr>
+            <a:picLocks noChangeAspect="1" noChangeArrowheads="1"/>
+          </p:cNvPicPr>
+          <p:nvPr/>
+        </p:nvPicPr>
+        <p:blipFill>
+          <a:blip r:embed="rId8">
+            <a:extLst>
+              <a:ext uri="{28A0092B-C50C-407E-A947-70E740481C1C}">
+                <a14:useLocalDpi xmlns:a14="http://schemas.microsoft.com/office/drawing/2010/main" val="0"/>
+              </a:ext>
+            </a:extLst>
+          </a:blip>
+          <a:srcRect/>
+          <a:stretch>
+            <a:fillRect/>
+          </a:stretch>
+        </p:blipFill>
+        <p:spPr bwMode="auto">
+          <a:xfrm>
+            <a:off x="8826894" y="1559967"/>
+            <a:ext cx="548640" cy="548640"/>
+          </a:xfrm>
+          <a:prstGeom prst="rect">
+            <a:avLst/>
+          </a:prstGeom>
+          <a:noFill/>
+          <a:ln>
+            <a:noFill/>
+          </a:ln>
+          <a:extLst>
+            <a:ext uri="{909E8E84-426E-40DD-AFC4-6F175D3DCCD1}">
+              <a14:hiddenFill xmlns:a14="http://schemas.microsoft.com/office/drawing/2010/main">
+                <a:solidFill>
+                  <a:srgbClr val="FFFFFF"/>
+                </a:solidFill>
+              </a14:hiddenFill>
+            </a:ext>
+            <a:ext uri="{91240B29-F687-4F45-9708-019B960494DF}">
+              <a14:hiddenLine xmlns:a14="http://schemas.microsoft.com/office/drawing/2010/main" w="9525">
+                <a:solidFill>
+                  <a:srgbClr val="000000"/>
+                </a:solidFill>
+                <a:miter lim="800000"/>
+                <a:headEnd/>
+                <a:tailEnd/>
+              </a14:hiddenLine>
+            </a:ext>
+          </a:extLst>
+        </p:spPr>
+      </p:pic>
+      <p:pic>
+        <p:nvPicPr>
+          <p:cNvPr id="74" name="Graphic 51">
+            <a:extLst>
+              <a:ext uri="{FF2B5EF4-FFF2-40B4-BE49-F238E27FC236}">
+                <a16:creationId xmlns:a16="http://schemas.microsoft.com/office/drawing/2014/main" id="{2994893D-A32C-E942-99FE-4CD5F257EE2C}"/>
+              </a:ext>
+            </a:extLst>
+          </p:cNvPr>
+          <p:cNvPicPr>
+            <a:picLocks noChangeAspect="1" noChangeArrowheads="1"/>
+          </p:cNvPicPr>
+          <p:nvPr/>
+        </p:nvPicPr>
+        <p:blipFill>
+          <a:blip r:embed="rId9">
+            <a:extLst>
+              <a:ext uri="{28A0092B-C50C-407E-A947-70E740481C1C}">
+                <a14:useLocalDpi xmlns:a14="http://schemas.microsoft.com/office/drawing/2010/main" val="0"/>
+              </a:ext>
+            </a:extLst>
+          </a:blip>
+          <a:srcRect/>
+          <a:stretch>
+            <a:fillRect/>
+          </a:stretch>
+        </p:blipFill>
+        <p:spPr bwMode="auto">
+          <a:xfrm>
+            <a:off x="9377260" y="2727893"/>
+            <a:ext cx="457200" cy="457200"/>
+          </a:xfrm>
+          <a:prstGeom prst="rect">
+            <a:avLst/>
+          </a:prstGeom>
+          <a:noFill/>
+          <a:ln>
+            <a:noFill/>
+          </a:ln>
+          <a:extLst>
+            <a:ext uri="{909E8E84-426E-40DD-AFC4-6F175D3DCCD1}">
+              <a14:hiddenFill xmlns:a14="http://schemas.microsoft.com/office/drawing/2010/main">
+                <a:solidFill>
+                  <a:srgbClr val="FFFFFF"/>
+                </a:solidFill>
+              </a14:hiddenFill>
+            </a:ext>
+            <a:ext uri="{91240B29-F687-4F45-9708-019B960494DF}">
+              <a14:hiddenLine xmlns:a14="http://schemas.microsoft.com/office/drawing/2010/main" w="9525">
+                <a:solidFill>
+                  <a:srgbClr val="000000"/>
+                </a:solidFill>
+                <a:miter lim="800000"/>
+                <a:headEnd/>
+                <a:tailEnd/>
+              </a14:hiddenLine>
+            </a:ext>
+          </a:extLst>
+        </p:spPr>
+      </p:pic>
+      <p:pic>
+        <p:nvPicPr>
+          <p:cNvPr id="75" name="Graphic 8">
+            <a:extLst>
+              <a:ext uri="{FF2B5EF4-FFF2-40B4-BE49-F238E27FC236}">
+                <a16:creationId xmlns:a16="http://schemas.microsoft.com/office/drawing/2014/main" id="{B9CEABDF-E345-7A44-8682-9523FB7A0B6C}"/>
+              </a:ext>
+            </a:extLst>
+          </p:cNvPr>
+          <p:cNvPicPr>
+            <a:picLocks noChangeAspect="1" noChangeArrowheads="1"/>
+          </p:cNvPicPr>
+          <p:nvPr/>
+        </p:nvPicPr>
+        <p:blipFill>
+          <a:blip r:embed="rId10">
+            <a:extLst>
+              <a:ext uri="{28A0092B-C50C-407E-A947-70E740481C1C}">
+                <a14:useLocalDpi xmlns:a14="http://schemas.microsoft.com/office/drawing/2010/main" val="0"/>
+              </a:ext>
+            </a:extLst>
+          </a:blip>
+          <a:srcRect/>
+          <a:stretch>
+            <a:fillRect/>
+          </a:stretch>
+        </p:blipFill>
+        <p:spPr bwMode="auto">
+          <a:xfrm>
+            <a:off x="9923114" y="2108247"/>
+            <a:ext cx="548640" cy="548640"/>
+          </a:xfrm>
+          <a:prstGeom prst="rect">
+            <a:avLst/>
+          </a:prstGeom>
+          <a:noFill/>
+          <a:ln>
+            <a:noFill/>
+          </a:ln>
+          <a:extLst>
+            <a:ext uri="{909E8E84-426E-40DD-AFC4-6F175D3DCCD1}">
+              <a14:hiddenFill xmlns:a14="http://schemas.microsoft.com/office/drawing/2010/main">
+                <a:solidFill>
+                  <a:srgbClr val="FFFFFF"/>
+                </a:solidFill>
+              </a14:hiddenFill>
+            </a:ext>
+            <a:ext uri="{91240B29-F687-4F45-9708-019B960494DF}">
+              <a14:hiddenLine xmlns:a14="http://schemas.microsoft.com/office/drawing/2010/main" w="9525">
+                <a:solidFill>
+                  <a:srgbClr val="000000"/>
+                </a:solidFill>
+                <a:miter lim="800000"/>
+                <a:headEnd/>
+                <a:tailEnd/>
+              </a14:hiddenLine>
+            </a:ext>
+          </a:extLst>
+        </p:spPr>
+      </p:pic>
+      <p:pic>
+        <p:nvPicPr>
+          <p:cNvPr id="76" name="Graphic 5">
+            <a:extLst>
+              <a:ext uri="{FF2B5EF4-FFF2-40B4-BE49-F238E27FC236}">
+                <a16:creationId xmlns:a16="http://schemas.microsoft.com/office/drawing/2014/main" id="{CBDBEB3D-EDFB-6C4B-BAEE-727447D88F72}"/>
+              </a:ext>
+            </a:extLst>
+          </p:cNvPr>
+          <p:cNvPicPr>
+            <a:picLocks noChangeAspect="1" noChangeArrowheads="1"/>
+          </p:cNvPicPr>
+          <p:nvPr/>
+        </p:nvPicPr>
+        <p:blipFill>
+          <a:blip r:embed="rId11">
+            <a:extLst>
+              <a:ext uri="{28A0092B-C50C-407E-A947-70E740481C1C}">
+                <a14:useLocalDpi xmlns:a14="http://schemas.microsoft.com/office/drawing/2010/main" val="0"/>
+              </a:ext>
+            </a:extLst>
+          </a:blip>
+          <a:srcRect/>
+          <a:stretch>
+            <a:fillRect/>
+          </a:stretch>
+        </p:blipFill>
+        <p:spPr bwMode="auto">
+          <a:xfrm>
+            <a:off x="8826894" y="2108247"/>
+            <a:ext cx="548640" cy="548640"/>
+          </a:xfrm>
+          <a:prstGeom prst="rect">
+            <a:avLst/>
+          </a:prstGeom>
+          <a:noFill/>
+          <a:ln>
+            <a:noFill/>
+          </a:ln>
+          <a:extLst>
+            <a:ext uri="{909E8E84-426E-40DD-AFC4-6F175D3DCCD1}">
+              <a14:hiddenFill xmlns:a14="http://schemas.microsoft.com/office/drawing/2010/main">
+                <a:solidFill>
+                  <a:srgbClr val="FFFFFF"/>
+                </a:solidFill>
+              </a14:hiddenFill>
+            </a:ext>
+            <a:ext uri="{91240B29-F687-4F45-9708-019B960494DF}">
+              <a14:hiddenLine xmlns:a14="http://schemas.microsoft.com/office/drawing/2010/main" w="9525">
+                <a:solidFill>
+                  <a:srgbClr val="000000"/>
+                </a:solidFill>
+                <a:miter lim="800000"/>
+                <a:headEnd/>
+                <a:tailEnd/>
+              </a14:hiddenLine>
+            </a:ext>
+          </a:extLst>
+        </p:spPr>
+      </p:pic>
+      <p:pic>
+        <p:nvPicPr>
+          <p:cNvPr id="77" name="Graphic 23">
+            <a:extLst>
+              <a:ext uri="{FF2B5EF4-FFF2-40B4-BE49-F238E27FC236}">
+                <a16:creationId xmlns:a16="http://schemas.microsoft.com/office/drawing/2014/main" id="{D57F822B-9454-0A46-9ACC-4B50DD42B0FF}"/>
+              </a:ext>
+            </a:extLst>
+          </p:cNvPr>
+          <p:cNvPicPr>
+            <a:picLocks noChangeAspect="1" noChangeArrowheads="1"/>
+          </p:cNvPicPr>
+          <p:nvPr/>
+        </p:nvPicPr>
+        <p:blipFill>
+          <a:blip r:embed="rId12">
+            <a:extLst>
+              <a:ext uri="{28A0092B-C50C-407E-A947-70E740481C1C}">
+                <a14:useLocalDpi xmlns:a14="http://schemas.microsoft.com/office/drawing/2010/main" val="0"/>
+              </a:ext>
+            </a:extLst>
+          </a:blip>
+          <a:srcRect/>
+          <a:stretch>
+            <a:fillRect/>
+          </a:stretch>
+        </p:blipFill>
+        <p:spPr bwMode="auto">
+          <a:xfrm>
+            <a:off x="9377260" y="1559967"/>
+            <a:ext cx="548640" cy="548640"/>
+          </a:xfrm>
+          <a:prstGeom prst="rect">
+            <a:avLst/>
+          </a:prstGeom>
+          <a:noFill/>
+          <a:ln>
+            <a:noFill/>
+          </a:ln>
+          <a:extLst>
+            <a:ext uri="{909E8E84-426E-40DD-AFC4-6F175D3DCCD1}">
+              <a14:hiddenFill xmlns:a14="http://schemas.microsoft.com/office/drawing/2010/main">
+                <a:solidFill>
+                  <a:srgbClr val="FFFFFF"/>
+                </a:solidFill>
+              </a14:hiddenFill>
+            </a:ext>
+            <a:ext uri="{91240B29-F687-4F45-9708-019B960494DF}">
+              <a14:hiddenLine xmlns:a14="http://schemas.microsoft.com/office/drawing/2010/main" w="9525">
+                <a:solidFill>
+                  <a:srgbClr val="000000"/>
+                </a:solidFill>
+                <a:miter lim="800000"/>
+                <a:headEnd/>
+                <a:tailEnd/>
+              </a14:hiddenLine>
+            </a:ext>
+          </a:extLst>
+        </p:spPr>
+      </p:pic>
+      <p:pic>
+        <p:nvPicPr>
+          <p:cNvPr id="82" name="Graphic 81">
+            <a:extLst>
+              <a:ext uri="{FF2B5EF4-FFF2-40B4-BE49-F238E27FC236}">
+                <a16:creationId xmlns:a16="http://schemas.microsoft.com/office/drawing/2014/main" id="{25A427FD-1918-BD45-9054-5EEC8501ED7F}"/>
+              </a:ext>
+            </a:extLst>
+          </p:cNvPr>
+          <p:cNvPicPr>
+            <a:picLocks noChangeAspect="1" noChangeArrowheads="1"/>
+          </p:cNvPicPr>
+          <p:nvPr/>
+        </p:nvPicPr>
+        <p:blipFill>
+          <a:blip r:embed="rId13">
+            <a:extLst>
+              <a:ext uri="{96DAC541-7B7A-43D3-8B79-37D633B846F1}">
+                <asvg:svgBlip xmlns:asvg="http://schemas.microsoft.com/office/drawing/2016/SVG/main" r:embed="rId14"/>
+              </a:ext>
+            </a:extLst>
+          </a:blip>
+          <a:srcRect/>
+          <a:stretch/>
+        </p:blipFill>
+        <p:spPr bwMode="auto">
+          <a:xfrm>
+            <a:off x="6219666" y="3251254"/>
+            <a:ext cx="457200" cy="457200"/>
+          </a:xfrm>
+          <a:prstGeom prst="rect">
+            <a:avLst/>
+          </a:prstGeom>
+          <a:noFill/>
+          <a:ln>
+            <a:noFill/>
+          </a:ln>
+          <a:extLst>
+            <a:ext uri="{909E8E84-426E-40DD-AFC4-6F175D3DCCD1}">
+              <a14:hiddenFill xmlns:a14="http://schemas.microsoft.com/office/drawing/2010/main">
+                <a:solidFill>
+                  <a:srgbClr val="FFFFFF"/>
+                </a:solidFill>
+              </a14:hiddenFill>
+            </a:ext>
+            <a:ext uri="{91240B29-F687-4F45-9708-019B960494DF}">
+              <a14:hiddenLine xmlns:a14="http://schemas.microsoft.com/office/drawing/2010/main" w="9525">
+                <a:solidFill>
+                  <a:srgbClr val="000000"/>
+                </a:solidFill>
+                <a:miter lim="800000"/>
+                <a:headEnd/>
+                <a:tailEnd/>
+              </a14:hiddenLine>
+            </a:ext>
+          </a:extLst>
+        </p:spPr>
+      </p:pic>
+      <p:pic>
+        <p:nvPicPr>
+          <p:cNvPr id="83" name="Graphic 49">
+            <a:extLst>
+              <a:ext uri="{FF2B5EF4-FFF2-40B4-BE49-F238E27FC236}">
+                <a16:creationId xmlns:a16="http://schemas.microsoft.com/office/drawing/2014/main" id="{B0314E71-37E7-8948-9C11-25F4FE9D0C73}"/>
+              </a:ext>
+            </a:extLst>
+          </p:cNvPr>
+          <p:cNvPicPr>
+            <a:picLocks noChangeAspect="1" noChangeArrowheads="1"/>
+          </p:cNvPicPr>
+          <p:nvPr/>
+        </p:nvPicPr>
+        <p:blipFill>
+          <a:blip r:embed="rId15">
+            <a:extLst>
+              <a:ext uri="{28A0092B-C50C-407E-A947-70E740481C1C}">
+                <a14:useLocalDpi xmlns:a14="http://schemas.microsoft.com/office/drawing/2010/main" val="0"/>
+              </a:ext>
+            </a:extLst>
+          </a:blip>
+          <a:srcRect/>
+          <a:stretch>
+            <a:fillRect/>
+          </a:stretch>
+        </p:blipFill>
+        <p:spPr bwMode="auto">
+          <a:xfrm>
+            <a:off x="5917987" y="3766702"/>
+            <a:ext cx="457200" cy="457200"/>
+          </a:xfrm>
+          <a:prstGeom prst="rect">
+            <a:avLst/>
+          </a:prstGeom>
+          <a:noFill/>
+          <a:ln>
+            <a:noFill/>
+          </a:ln>
+          <a:extLst>
+            <a:ext uri="{909E8E84-426E-40DD-AFC4-6F175D3DCCD1}">
+              <a14:hiddenFill xmlns:a14="http://schemas.microsoft.com/office/drawing/2010/main">
+                <a:solidFill>
+                  <a:srgbClr val="FFFFFF"/>
+                </a:solidFill>
+              </a14:hiddenFill>
+            </a:ext>
+            <a:ext uri="{91240B29-F687-4F45-9708-019B960494DF}">
+              <a14:hiddenLine xmlns:a14="http://schemas.microsoft.com/office/drawing/2010/main" w="9525">
+                <a:solidFill>
+                  <a:srgbClr val="000000"/>
+                </a:solidFill>
+                <a:miter lim="800000"/>
+                <a:headEnd/>
+                <a:tailEnd/>
+              </a14:hiddenLine>
+            </a:ext>
+          </a:extLst>
+        </p:spPr>
+      </p:pic>
+      <p:cxnSp>
+        <p:nvCxnSpPr>
+          <p:cNvPr id="88" name="Straight Arrow Connector 87">
+            <a:extLst>
+              <a:ext uri="{FF2B5EF4-FFF2-40B4-BE49-F238E27FC236}">
+                <a16:creationId xmlns:a16="http://schemas.microsoft.com/office/drawing/2014/main" id="{825451CC-6231-CE48-960F-3C2A7E765D73}"/>
+              </a:ext>
+            </a:extLst>
+          </p:cNvPr>
+          <p:cNvCxnSpPr>
+            <a:stCxn id="69" idx="3"/>
+            <a:endCxn id="76" idx="1"/>
+          </p:cNvCxnSpPr>
+          <p:nvPr/>
+        </p:nvCxnSpPr>
+        <p:spPr>
+          <a:xfrm>
+            <a:off x="6448266" y="2378657"/>
+            <a:ext cx="2378628" cy="3910"/>
+          </a:xfrm>
+          <a:prstGeom prst="straightConnector1">
+            <a:avLst/>
+          </a:prstGeom>
+          <a:ln w="19050">
+            <a:solidFill>
+              <a:schemeClr val="tx1"/>
+            </a:solidFill>
+            <a:tailEnd type="triangle"/>
+          </a:ln>
+        </p:spPr>
+        <p:style>
+          <a:lnRef idx="1">
+            <a:schemeClr val="accent1"/>
+          </a:lnRef>
+          <a:fillRef idx="0">
+            <a:schemeClr val="accent1"/>
+          </a:fillRef>
+          <a:effectRef idx="0">
+            <a:schemeClr val="accent1"/>
+          </a:effectRef>
+          <a:fontRef idx="minor">
+            <a:schemeClr val="tx1"/>
+          </a:fontRef>
+        </p:style>
+      </p:cxnSp>
+      <p:pic>
+        <p:nvPicPr>
+          <p:cNvPr id="40" name="Graphic 6">
+            <a:extLst>
+              <a:ext uri="{FF2B5EF4-FFF2-40B4-BE49-F238E27FC236}">
+                <a16:creationId xmlns:a16="http://schemas.microsoft.com/office/drawing/2014/main" id="{0BD123EE-3C2E-4FA1-A4B3-77B084D23E53}"/>
+              </a:ext>
+            </a:extLst>
+          </p:cNvPr>
+          <p:cNvPicPr>
+            <a:picLocks noChangeAspect="1" noChangeArrowheads="1"/>
+          </p:cNvPicPr>
+          <p:nvPr/>
+        </p:nvPicPr>
+        <p:blipFill>
+          <a:blip r:embed="rId16">
+            <a:extLst>
+              <a:ext uri="{28A0092B-C50C-407E-A947-70E740481C1C}">
+                <a14:useLocalDpi xmlns:a14="http://schemas.microsoft.com/office/drawing/2010/main" val="0"/>
+              </a:ext>
+            </a:extLst>
+          </a:blip>
+          <a:srcRect/>
+          <a:stretch>
+            <a:fillRect/>
+          </a:stretch>
+        </p:blipFill>
+        <p:spPr bwMode="auto">
+          <a:xfrm>
+            <a:off x="2210248" y="1583644"/>
+            <a:ext cx="548640" cy="548640"/>
+          </a:xfrm>
+          <a:prstGeom prst="rect">
+            <a:avLst/>
+          </a:prstGeom>
+          <a:noFill/>
+          <a:ln>
+            <a:noFill/>
+          </a:ln>
+          <a:extLst>
+            <a:ext uri="{909E8E84-426E-40DD-AFC4-6F175D3DCCD1}">
+              <a14:hiddenFill xmlns:a14="http://schemas.microsoft.com/office/drawing/2010/main">
+                <a:solidFill>
+                  <a:srgbClr val="FFFFFF"/>
+                </a:solidFill>
+              </a14:hiddenFill>
+            </a:ext>
+            <a:ext uri="{91240B29-F687-4F45-9708-019B960494DF}">
+              <a14:hiddenLine xmlns:a14="http://schemas.microsoft.com/office/drawing/2010/main" w="9525">
+                <a:solidFill>
+                  <a:srgbClr val="000000"/>
+                </a:solidFill>
+                <a:miter lim="800000"/>
+                <a:headEnd/>
+                <a:tailEnd/>
+              </a14:hiddenLine>
+            </a:ext>
+          </a:extLst>
+        </p:spPr>
+      </p:pic>
+      <p:sp>
+        <p:nvSpPr>
+          <p:cNvPr id="42" name="TextBox 18">
+            <a:extLst>
+              <a:ext uri="{FF2B5EF4-FFF2-40B4-BE49-F238E27FC236}">
+                <a16:creationId xmlns:a16="http://schemas.microsoft.com/office/drawing/2014/main" id="{691D1FB9-F718-442C-9A3D-E5683BB13B17}"/>
+              </a:ext>
+            </a:extLst>
+          </p:cNvPr>
+          <p:cNvSpPr txBox="1">
+            <a:spLocks noChangeArrowheads="1"/>
+          </p:cNvSpPr>
+          <p:nvPr/>
+        </p:nvSpPr>
+        <p:spPr bwMode="auto">
+          <a:xfrm>
+            <a:off x="1725835" y="2143035"/>
+            <a:ext cx="1535489" cy="276999"/>
+          </a:xfrm>
+          <a:prstGeom prst="rect">
+            <a:avLst/>
+          </a:prstGeom>
+          <a:noFill/>
+          <a:ln>
+            <a:noFill/>
+          </a:ln>
+          <a:extLst>
+            <a:ext uri="{909E8E84-426E-40DD-AFC4-6F175D3DCCD1}">
+              <a14:hiddenFill xmlns:a14="http://schemas.microsoft.com/office/drawing/2010/main">
+                <a:solidFill>
+                  <a:srgbClr val="FFFFFF"/>
+                </a:solidFill>
+              </a14:hiddenFill>
+            </a:ext>
+            <a:ext uri="{91240B29-F687-4F45-9708-019B960494DF}">
+              <a14:hiddenLine xmlns:a14="http://schemas.microsoft.com/office/drawing/2010/main" w="9525">
+                <a:solidFill>
+                  <a:srgbClr val="000000"/>
+                </a:solidFill>
+                <a:miter lim="800000"/>
+                <a:headEnd/>
+                <a:tailEnd/>
+              </a14:hiddenLine>
+            </a:ext>
+          </a:extLst>
+        </p:spPr>
+        <p:txBody>
+          <a:bodyPr wrap="square">
+            <a:spAutoFit/>
+          </a:bodyPr>
+          <a:lstStyle>
+            <a:lvl1pPr>
+              <a:defRPr>
+                <a:solidFill>
+                  <a:schemeClr val="tx1"/>
+                </a:solidFill>
+                <a:latin typeface="Calibri" panose="020F0502020204030204" pitchFamily="34" charset="0"/>
+              </a:defRPr>
+            </a:lvl1pPr>
+            <a:lvl2pPr marL="742950" indent="-285750">
+              <a:defRPr>
+                <a:solidFill>
+                  <a:schemeClr val="tx1"/>
+                </a:solidFill>
+                <a:latin typeface="Calibri" panose="020F0502020204030204" pitchFamily="34" charset="0"/>
+              </a:defRPr>
+            </a:lvl2pPr>
+            <a:lvl3pPr marL="1143000" indent="-228600">
+              <a:defRPr>
+                <a:solidFill>
+                  <a:schemeClr val="tx1"/>
+                </a:solidFill>
+                <a:latin typeface="Calibri" panose="020F0502020204030204" pitchFamily="34" charset="0"/>
+              </a:defRPr>
+            </a:lvl3pPr>
+            <a:lvl4pPr marL="1600200" indent="-228600">
+              <a:defRPr>
+                <a:solidFill>
+                  <a:schemeClr val="tx1"/>
+                </a:solidFill>
+                <a:latin typeface="Calibri" panose="020F0502020204030204" pitchFamily="34" charset="0"/>
+              </a:defRPr>
+            </a:lvl4pPr>
+            <a:lvl5pPr marL="2057400" indent="-228600">
+              <a:defRPr>
+                <a:solidFill>
+                  <a:schemeClr val="tx1"/>
+                </a:solidFill>
+                <a:latin typeface="Calibri" panose="020F0502020204030204" pitchFamily="34" charset="0"/>
+              </a:defRPr>
+            </a:lvl5pPr>
+            <a:lvl6pPr marL="2514600" indent="-228600" eaLnBrk="0" fontAlgn="base" hangingPunct="0">
+              <a:spcBef>
+                <a:spcPct val="0"/>
+              </a:spcBef>
+              <a:spcAft>
+                <a:spcPct val="0"/>
+              </a:spcAft>
+              <a:defRPr>
+                <a:solidFill>
+                  <a:schemeClr val="tx1"/>
+                </a:solidFill>
+                <a:latin typeface="Calibri" panose="020F0502020204030204" pitchFamily="34" charset="0"/>
+              </a:defRPr>
+            </a:lvl6pPr>
+            <a:lvl7pPr marL="2971800" indent="-228600" eaLnBrk="0" fontAlgn="base" hangingPunct="0">
+              <a:spcBef>
+                <a:spcPct val="0"/>
+              </a:spcBef>
+              <a:spcAft>
+                <a:spcPct val="0"/>
+              </a:spcAft>
+              <a:defRPr>
+                <a:solidFill>
+                  <a:schemeClr val="tx1"/>
+                </a:solidFill>
+                <a:latin typeface="Calibri" panose="020F0502020204030204" pitchFamily="34" charset="0"/>
+              </a:defRPr>
+            </a:lvl7pPr>
+            <a:lvl8pPr marL="3429000" indent="-228600" eaLnBrk="0" fontAlgn="base" hangingPunct="0">
+              <a:spcBef>
+                <a:spcPct val="0"/>
+              </a:spcBef>
+              <a:spcAft>
+                <a:spcPct val="0"/>
+              </a:spcAft>
+              <a:defRPr>
+                <a:solidFill>
+                  <a:schemeClr val="tx1"/>
+                </a:solidFill>
+                <a:latin typeface="Calibri" panose="020F0502020204030204" pitchFamily="34" charset="0"/>
+              </a:defRPr>
+            </a:lvl8pPr>
+            <a:lvl9pPr marL="3886200" indent="-228600" eaLnBrk="0" fontAlgn="base" hangingPunct="0">
+              <a:spcBef>
+                <a:spcPct val="0"/>
+              </a:spcBef>
+              <a:spcAft>
+                <a:spcPct val="0"/>
+              </a:spcAft>
+              <a:defRPr>
+                <a:solidFill>
+                  <a:schemeClr val="tx1"/>
+                </a:solidFill>
+                <a:latin typeface="Calibri" panose="020F0502020204030204" pitchFamily="34" charset="0"/>
+              </a:defRPr>
+            </a:lvl9pPr>
+          </a:lstStyle>
+          <a:p>
+            <a:pPr algn="ctr" eaLnBrk="1" hangingPunct="1"/>
+            <a:r>
+              <a:rPr lang="en-US" altLang="en-US" sz="1200" dirty="0">
+                <a:latin typeface="Arial" panose="020B0604020202020204" pitchFamily="34" charset="0"/>
+                <a:ea typeface="Amazon Ember" panose="020B0603020204020204" pitchFamily="34" charset="0"/>
+                <a:cs typeface="Arial" panose="020B0604020202020204" pitchFamily="34" charset="0"/>
+              </a:rPr>
+              <a:t>AWS Organizations</a:t>
+            </a:r>
+          </a:p>
+        </p:txBody>
+      </p:sp>
+      <p:sp>
+        <p:nvSpPr>
+          <p:cNvPr id="52" name="TextBox 9">
+            <a:extLst>
+              <a:ext uri="{FF2B5EF4-FFF2-40B4-BE49-F238E27FC236}">
+                <a16:creationId xmlns:a16="http://schemas.microsoft.com/office/drawing/2014/main" id="{D360560E-677E-4B44-BD81-C04F36DA4CD6}"/>
+              </a:ext>
+            </a:extLst>
+          </p:cNvPr>
+          <p:cNvSpPr txBox="1">
+            <a:spLocks noChangeArrowheads="1"/>
+          </p:cNvSpPr>
+          <p:nvPr/>
+        </p:nvSpPr>
+        <p:spPr bwMode="auto">
+          <a:xfrm>
+            <a:off x="5534627" y="4125528"/>
+            <a:ext cx="1297877" cy="646331"/>
+          </a:xfrm>
+          <a:prstGeom prst="rect">
+            <a:avLst/>
+          </a:prstGeom>
+          <a:noFill/>
+          <a:ln>
+            <a:noFill/>
+          </a:ln>
+          <a:extLst>
+            <a:ext uri="{909E8E84-426E-40DD-AFC4-6F175D3DCCD1}">
+              <a14:hiddenFill xmlns:a14="http://schemas.microsoft.com/office/drawing/2010/main">
+                <a:solidFill>
+                  <a:srgbClr val="FFFFFF"/>
+                </a:solidFill>
+              </a14:hiddenFill>
+            </a:ext>
+            <a:ext uri="{91240B29-F687-4F45-9708-019B960494DF}">
+              <a14:hiddenLine xmlns:a14="http://schemas.microsoft.com/office/drawing/2010/main" w="9525">
+                <a:solidFill>
+                  <a:srgbClr val="000000"/>
+                </a:solidFill>
+                <a:miter lim="800000"/>
+                <a:headEnd/>
+                <a:tailEnd/>
+              </a14:hiddenLine>
+            </a:ext>
+          </a:extLst>
+        </p:spPr>
+        <p:txBody>
+          <a:bodyPr wrap="square">
+            <a:spAutoFit/>
+          </a:bodyPr>
+          <a:lstStyle>
+            <a:lvl1pPr>
+              <a:defRPr>
+                <a:solidFill>
+                  <a:schemeClr val="tx1"/>
+                </a:solidFill>
+                <a:latin typeface="Calibri" panose="020F0502020204030204" pitchFamily="34" charset="0"/>
+              </a:defRPr>
+            </a:lvl1pPr>
+            <a:lvl2pPr marL="742950" indent="-285750">
+              <a:defRPr>
+                <a:solidFill>
+                  <a:schemeClr val="tx1"/>
+                </a:solidFill>
+                <a:latin typeface="Calibri" panose="020F0502020204030204" pitchFamily="34" charset="0"/>
+              </a:defRPr>
+            </a:lvl2pPr>
+            <a:lvl3pPr marL="1143000" indent="-228600">
+              <a:defRPr>
+                <a:solidFill>
+                  <a:schemeClr val="tx1"/>
+                </a:solidFill>
+                <a:latin typeface="Calibri" panose="020F0502020204030204" pitchFamily="34" charset="0"/>
+              </a:defRPr>
+            </a:lvl3pPr>
+            <a:lvl4pPr marL="1600200" indent="-228600">
+              <a:defRPr>
+                <a:solidFill>
+                  <a:schemeClr val="tx1"/>
+                </a:solidFill>
+                <a:latin typeface="Calibri" panose="020F0502020204030204" pitchFamily="34" charset="0"/>
+              </a:defRPr>
+            </a:lvl4pPr>
+            <a:lvl5pPr marL="2057400" indent="-228600">
+              <a:defRPr>
+                <a:solidFill>
+                  <a:schemeClr val="tx1"/>
+                </a:solidFill>
+                <a:latin typeface="Calibri" panose="020F0502020204030204" pitchFamily="34" charset="0"/>
+              </a:defRPr>
+            </a:lvl5pPr>
+            <a:lvl6pPr marL="2514600" indent="-228600" eaLnBrk="0" fontAlgn="base" hangingPunct="0">
+              <a:spcBef>
+                <a:spcPct val="0"/>
+              </a:spcBef>
+              <a:spcAft>
+                <a:spcPct val="0"/>
+              </a:spcAft>
+              <a:defRPr>
+                <a:solidFill>
+                  <a:schemeClr val="tx1"/>
+                </a:solidFill>
+                <a:latin typeface="Calibri" panose="020F0502020204030204" pitchFamily="34" charset="0"/>
+              </a:defRPr>
+            </a:lvl6pPr>
+            <a:lvl7pPr marL="2971800" indent="-228600" eaLnBrk="0" fontAlgn="base" hangingPunct="0">
+              <a:spcBef>
+                <a:spcPct val="0"/>
+              </a:spcBef>
+              <a:spcAft>
+                <a:spcPct val="0"/>
+              </a:spcAft>
+              <a:defRPr>
+                <a:solidFill>
+                  <a:schemeClr val="tx1"/>
+                </a:solidFill>
+                <a:latin typeface="Calibri" panose="020F0502020204030204" pitchFamily="34" charset="0"/>
+              </a:defRPr>
+            </a:lvl7pPr>
+            <a:lvl8pPr marL="3429000" indent="-228600" eaLnBrk="0" fontAlgn="base" hangingPunct="0">
+              <a:spcBef>
+                <a:spcPct val="0"/>
+              </a:spcBef>
+              <a:spcAft>
+                <a:spcPct val="0"/>
+              </a:spcAft>
+              <a:defRPr>
+                <a:solidFill>
+                  <a:schemeClr val="tx1"/>
+                </a:solidFill>
+                <a:latin typeface="Calibri" panose="020F0502020204030204" pitchFamily="34" charset="0"/>
+              </a:defRPr>
+            </a:lvl8pPr>
+            <a:lvl9pPr marL="3886200" indent="-228600" eaLnBrk="0" fontAlgn="base" hangingPunct="0">
+              <a:spcBef>
+                <a:spcPct val="0"/>
+              </a:spcBef>
+              <a:spcAft>
+                <a:spcPct val="0"/>
+              </a:spcAft>
+              <a:defRPr>
+                <a:solidFill>
+                  <a:schemeClr val="tx1"/>
+                </a:solidFill>
+                <a:latin typeface="Calibri" panose="020F0502020204030204" pitchFamily="34" charset="0"/>
+              </a:defRPr>
+            </a:lvl9pPr>
+          </a:lstStyle>
+          <a:p>
+            <a:pPr algn="ctr" eaLnBrk="1" hangingPunct="1"/>
+            <a:r>
+              <a:rPr lang="en-US" altLang="en-US" sz="1200" dirty="0">
+                <a:latin typeface="Arial" panose="020B0604020202020204" pitchFamily="34" charset="0"/>
+                <a:ea typeface="Amazon Ember" panose="020B0603020204020204" pitchFamily="34" charset="0"/>
+                <a:cs typeface="Arial" panose="020B0604020202020204" pitchFamily="34" charset="0"/>
+              </a:rPr>
+              <a:t>Common Prerequisites Solution</a:t>
+            </a:r>
+          </a:p>
+        </p:txBody>
+      </p:sp>
+      <p:pic>
+        <p:nvPicPr>
+          <p:cNvPr id="54" name="Graphic 53">
+            <a:extLst>
+              <a:ext uri="{FF2B5EF4-FFF2-40B4-BE49-F238E27FC236}">
+                <a16:creationId xmlns:a16="http://schemas.microsoft.com/office/drawing/2014/main" id="{87C0F64A-AB28-4AF8-A706-F344A7C82886}"/>
+              </a:ext>
+            </a:extLst>
+          </p:cNvPr>
+          <p:cNvPicPr>
+            <a:picLocks noChangeAspect="1"/>
+          </p:cNvPicPr>
+          <p:nvPr/>
+        </p:nvPicPr>
+        <p:blipFill>
+          <a:blip r:embed="rId17">
+            <a:extLst>
+              <a:ext uri="{96DAC541-7B7A-43D3-8B79-37D633B846F1}">
+                <asvg:svgBlip xmlns:asvg="http://schemas.microsoft.com/office/drawing/2016/SVG/main" r:embed="rId18"/>
+              </a:ext>
+            </a:extLst>
+          </a:blip>
+          <a:srcRect/>
+          <a:stretch/>
+        </p:blipFill>
+        <p:spPr>
+          <a:xfrm>
+            <a:off x="3917706" y="2150863"/>
+            <a:ext cx="457200" cy="457200"/>
+          </a:xfrm>
+          <a:prstGeom prst="rect">
+            <a:avLst/>
+          </a:prstGeom>
+        </p:spPr>
+      </p:pic>
+      <p:sp>
+        <p:nvSpPr>
+          <p:cNvPr id="55" name="TextBox 9">
+            <a:extLst>
+              <a:ext uri="{FF2B5EF4-FFF2-40B4-BE49-F238E27FC236}">
+                <a16:creationId xmlns:a16="http://schemas.microsoft.com/office/drawing/2014/main" id="{ED014F3A-AC3C-4E3A-A914-0AA98D55620D}"/>
+              </a:ext>
+            </a:extLst>
+          </p:cNvPr>
+          <p:cNvSpPr txBox="1">
+            <a:spLocks noChangeArrowheads="1"/>
+          </p:cNvSpPr>
+          <p:nvPr/>
+        </p:nvSpPr>
+        <p:spPr bwMode="auto">
+          <a:xfrm>
+            <a:off x="3489924" y="2566350"/>
+            <a:ext cx="1297877" cy="461665"/>
+          </a:xfrm>
+          <a:prstGeom prst="rect">
+            <a:avLst/>
+          </a:prstGeom>
+          <a:noFill/>
+          <a:ln>
+            <a:noFill/>
+          </a:ln>
+          <a:extLst>
+            <a:ext uri="{909E8E84-426E-40DD-AFC4-6F175D3DCCD1}">
+              <a14:hiddenFill xmlns:a14="http://schemas.microsoft.com/office/drawing/2010/main">
+                <a:solidFill>
+                  <a:srgbClr val="FFFFFF"/>
+                </a:solidFill>
+              </a14:hiddenFill>
+            </a:ext>
+            <a:ext uri="{91240B29-F687-4F45-9708-019B960494DF}">
+              <a14:hiddenLine xmlns:a14="http://schemas.microsoft.com/office/drawing/2010/main" w="9525">
+                <a:solidFill>
+                  <a:srgbClr val="000000"/>
+                </a:solidFill>
+                <a:miter lim="800000"/>
+                <a:headEnd/>
+                <a:tailEnd/>
+              </a14:hiddenLine>
+            </a:ext>
+          </a:extLst>
+        </p:spPr>
+        <p:txBody>
+          <a:bodyPr wrap="square">
+            <a:spAutoFit/>
+          </a:bodyPr>
+          <a:lstStyle>
+            <a:lvl1pPr>
+              <a:defRPr>
+                <a:solidFill>
+                  <a:schemeClr val="tx1"/>
+                </a:solidFill>
+                <a:latin typeface="Calibri" panose="020F0502020204030204" pitchFamily="34" charset="0"/>
+              </a:defRPr>
+            </a:lvl1pPr>
+            <a:lvl2pPr marL="742950" indent="-285750">
+              <a:defRPr>
+                <a:solidFill>
+                  <a:schemeClr val="tx1"/>
+                </a:solidFill>
+                <a:latin typeface="Calibri" panose="020F0502020204030204" pitchFamily="34" charset="0"/>
+              </a:defRPr>
+            </a:lvl2pPr>
+            <a:lvl3pPr marL="1143000" indent="-228600">
+              <a:defRPr>
+                <a:solidFill>
+                  <a:schemeClr val="tx1"/>
+                </a:solidFill>
+                <a:latin typeface="Calibri" panose="020F0502020204030204" pitchFamily="34" charset="0"/>
+              </a:defRPr>
+            </a:lvl3pPr>
+            <a:lvl4pPr marL="1600200" indent="-228600">
+              <a:defRPr>
+                <a:solidFill>
+                  <a:schemeClr val="tx1"/>
+                </a:solidFill>
+                <a:latin typeface="Calibri" panose="020F0502020204030204" pitchFamily="34" charset="0"/>
+              </a:defRPr>
+            </a:lvl4pPr>
+            <a:lvl5pPr marL="2057400" indent="-228600">
+              <a:defRPr>
+                <a:solidFill>
+                  <a:schemeClr val="tx1"/>
+                </a:solidFill>
+                <a:latin typeface="Calibri" panose="020F0502020204030204" pitchFamily="34" charset="0"/>
+              </a:defRPr>
+            </a:lvl5pPr>
+            <a:lvl6pPr marL="2514600" indent="-228600" eaLnBrk="0" fontAlgn="base" hangingPunct="0">
+              <a:spcBef>
+                <a:spcPct val="0"/>
+              </a:spcBef>
+              <a:spcAft>
+                <a:spcPct val="0"/>
+              </a:spcAft>
+              <a:defRPr>
+                <a:solidFill>
+                  <a:schemeClr val="tx1"/>
+                </a:solidFill>
+                <a:latin typeface="Calibri" panose="020F0502020204030204" pitchFamily="34" charset="0"/>
+              </a:defRPr>
+            </a:lvl6pPr>
+            <a:lvl7pPr marL="2971800" indent="-228600" eaLnBrk="0" fontAlgn="base" hangingPunct="0">
+              <a:spcBef>
+                <a:spcPct val="0"/>
+              </a:spcBef>
+              <a:spcAft>
+                <a:spcPct val="0"/>
+              </a:spcAft>
+              <a:defRPr>
+                <a:solidFill>
+                  <a:schemeClr val="tx1"/>
+                </a:solidFill>
+                <a:latin typeface="Calibri" panose="020F0502020204030204" pitchFamily="34" charset="0"/>
+              </a:defRPr>
+            </a:lvl7pPr>
+            <a:lvl8pPr marL="3429000" indent="-228600" eaLnBrk="0" fontAlgn="base" hangingPunct="0">
+              <a:spcBef>
+                <a:spcPct val="0"/>
+              </a:spcBef>
+              <a:spcAft>
+                <a:spcPct val="0"/>
+              </a:spcAft>
+              <a:defRPr>
+                <a:solidFill>
+                  <a:schemeClr val="tx1"/>
+                </a:solidFill>
+                <a:latin typeface="Calibri" panose="020F0502020204030204" pitchFamily="34" charset="0"/>
+              </a:defRPr>
+            </a:lvl8pPr>
+            <a:lvl9pPr marL="3886200" indent="-228600" eaLnBrk="0" fontAlgn="base" hangingPunct="0">
+              <a:spcBef>
+                <a:spcPct val="0"/>
+              </a:spcBef>
+              <a:spcAft>
+                <a:spcPct val="0"/>
+              </a:spcAft>
+              <a:defRPr>
+                <a:solidFill>
+                  <a:schemeClr val="tx1"/>
+                </a:solidFill>
+                <a:latin typeface="Calibri" panose="020F0502020204030204" pitchFamily="34" charset="0"/>
+              </a:defRPr>
+            </a:lvl9pPr>
+          </a:lstStyle>
+          <a:p>
+            <a:pPr algn="ctr" eaLnBrk="1" hangingPunct="1"/>
+            <a:r>
+              <a:rPr lang="en-US" altLang="en-US" sz="1200" dirty="0">
+                <a:latin typeface="Arial" panose="020B0604020202020204" pitchFamily="34" charset="0"/>
+                <a:ea typeface="Amazon Ember" panose="020B0603020204020204" pitchFamily="34" charset="0"/>
+                <a:cs typeface="Arial" panose="020B0604020202020204" pitchFamily="34" charset="0"/>
+              </a:rPr>
+              <a:t>Management Account</a:t>
+            </a:r>
+          </a:p>
+        </p:txBody>
+      </p:sp>
+      <p:pic>
+        <p:nvPicPr>
+          <p:cNvPr id="56" name="Graphic 7">
+            <a:extLst>
+              <a:ext uri="{FF2B5EF4-FFF2-40B4-BE49-F238E27FC236}">
+                <a16:creationId xmlns:a16="http://schemas.microsoft.com/office/drawing/2014/main" id="{EB4D963E-DA74-4F90-A127-271005138A89}"/>
+              </a:ext>
+            </a:extLst>
+          </p:cNvPr>
+          <p:cNvPicPr>
+            <a:picLocks noChangeAspect="1" noChangeArrowheads="1"/>
+          </p:cNvPicPr>
+          <p:nvPr/>
+        </p:nvPicPr>
+        <p:blipFill>
+          <a:blip r:embed="rId19">
+            <a:extLst>
+              <a:ext uri="{96DAC541-7B7A-43D3-8B79-37D633B846F1}">
+                <asvg:svgBlip xmlns:asvg="http://schemas.microsoft.com/office/drawing/2016/SVG/main" r:embed="rId20"/>
+              </a:ext>
+            </a:extLst>
+          </a:blip>
+          <a:srcRect/>
+          <a:stretch/>
+        </p:blipFill>
+        <p:spPr bwMode="auto">
+          <a:xfrm>
+            <a:off x="3595486" y="3455940"/>
+            <a:ext cx="457200" cy="457200"/>
+          </a:xfrm>
+          <a:prstGeom prst="rect">
+            <a:avLst/>
+          </a:prstGeom>
+          <a:noFill/>
+          <a:ln>
+            <a:noFill/>
+          </a:ln>
+          <a:extLst>
+            <a:ext uri="{909E8E84-426E-40DD-AFC4-6F175D3DCCD1}">
+              <a14:hiddenFill xmlns:a14="http://schemas.microsoft.com/office/drawing/2010/main">
+                <a:solidFill>
+                  <a:srgbClr val="FFFFFF"/>
+                </a:solidFill>
+              </a14:hiddenFill>
+            </a:ext>
+            <a:ext uri="{91240B29-F687-4F45-9708-019B960494DF}">
+              <a14:hiddenLine xmlns:a14="http://schemas.microsoft.com/office/drawing/2010/main" w="9525">
+                <a:solidFill>
+                  <a:srgbClr val="000000"/>
+                </a:solidFill>
+                <a:miter lim="800000"/>
+                <a:headEnd/>
+                <a:tailEnd/>
+              </a14:hiddenLine>
+            </a:ext>
+          </a:extLst>
+        </p:spPr>
+      </p:pic>
+      <p:sp>
+        <p:nvSpPr>
+          <p:cNvPr id="57" name="TextBox 9">
+            <a:extLst>
+              <a:ext uri="{FF2B5EF4-FFF2-40B4-BE49-F238E27FC236}">
+                <a16:creationId xmlns:a16="http://schemas.microsoft.com/office/drawing/2014/main" id="{C4410C28-5915-45DE-9618-906C58702317}"/>
+              </a:ext>
+            </a:extLst>
+          </p:cNvPr>
+          <p:cNvSpPr txBox="1">
+            <a:spLocks noChangeArrowheads="1"/>
+          </p:cNvSpPr>
+          <p:nvPr/>
+        </p:nvSpPr>
+        <p:spPr bwMode="auto">
+          <a:xfrm>
+            <a:off x="3169318" y="3888486"/>
+            <a:ext cx="1297877" cy="461665"/>
+          </a:xfrm>
+          <a:prstGeom prst="rect">
+            <a:avLst/>
+          </a:prstGeom>
+          <a:noFill/>
+          <a:ln>
+            <a:noFill/>
+          </a:ln>
+          <a:extLst>
+            <a:ext uri="{909E8E84-426E-40DD-AFC4-6F175D3DCCD1}">
+              <a14:hiddenFill xmlns:a14="http://schemas.microsoft.com/office/drawing/2010/main">
+                <a:solidFill>
+                  <a:srgbClr val="FFFFFF"/>
+                </a:solidFill>
+              </a14:hiddenFill>
+            </a:ext>
+            <a:ext uri="{91240B29-F687-4F45-9708-019B960494DF}">
+              <a14:hiddenLine xmlns:a14="http://schemas.microsoft.com/office/drawing/2010/main" w="9525">
+                <a:solidFill>
+                  <a:srgbClr val="000000"/>
+                </a:solidFill>
+                <a:miter lim="800000"/>
+                <a:headEnd/>
+                <a:tailEnd/>
+              </a14:hiddenLine>
+            </a:ext>
+          </a:extLst>
+        </p:spPr>
+        <p:txBody>
+          <a:bodyPr wrap="square">
+            <a:spAutoFit/>
+          </a:bodyPr>
+          <a:lstStyle>
+            <a:lvl1pPr>
+              <a:defRPr>
+                <a:solidFill>
+                  <a:schemeClr val="tx1"/>
+                </a:solidFill>
+                <a:latin typeface="Calibri" panose="020F0502020204030204" pitchFamily="34" charset="0"/>
+              </a:defRPr>
+            </a:lvl1pPr>
+            <a:lvl2pPr marL="742950" indent="-285750">
+              <a:defRPr>
+                <a:solidFill>
+                  <a:schemeClr val="tx1"/>
+                </a:solidFill>
+                <a:latin typeface="Calibri" panose="020F0502020204030204" pitchFamily="34" charset="0"/>
+              </a:defRPr>
+            </a:lvl2pPr>
+            <a:lvl3pPr marL="1143000" indent="-228600">
+              <a:defRPr>
+                <a:solidFill>
+                  <a:schemeClr val="tx1"/>
+                </a:solidFill>
+                <a:latin typeface="Calibri" panose="020F0502020204030204" pitchFamily="34" charset="0"/>
+              </a:defRPr>
+            </a:lvl3pPr>
+            <a:lvl4pPr marL="1600200" indent="-228600">
+              <a:defRPr>
+                <a:solidFill>
+                  <a:schemeClr val="tx1"/>
+                </a:solidFill>
+                <a:latin typeface="Calibri" panose="020F0502020204030204" pitchFamily="34" charset="0"/>
+              </a:defRPr>
+            </a:lvl4pPr>
+            <a:lvl5pPr marL="2057400" indent="-228600">
+              <a:defRPr>
+                <a:solidFill>
+                  <a:schemeClr val="tx1"/>
+                </a:solidFill>
+                <a:latin typeface="Calibri" panose="020F0502020204030204" pitchFamily="34" charset="0"/>
+              </a:defRPr>
+            </a:lvl5pPr>
+            <a:lvl6pPr marL="2514600" indent="-228600" eaLnBrk="0" fontAlgn="base" hangingPunct="0">
+              <a:spcBef>
+                <a:spcPct val="0"/>
+              </a:spcBef>
+              <a:spcAft>
+                <a:spcPct val="0"/>
+              </a:spcAft>
+              <a:defRPr>
+                <a:solidFill>
+                  <a:schemeClr val="tx1"/>
+                </a:solidFill>
+                <a:latin typeface="Calibri" panose="020F0502020204030204" pitchFamily="34" charset="0"/>
+              </a:defRPr>
+            </a:lvl6pPr>
+            <a:lvl7pPr marL="2971800" indent="-228600" eaLnBrk="0" fontAlgn="base" hangingPunct="0">
+              <a:spcBef>
+                <a:spcPct val="0"/>
+              </a:spcBef>
+              <a:spcAft>
+                <a:spcPct val="0"/>
+              </a:spcAft>
+              <a:defRPr>
+                <a:solidFill>
+                  <a:schemeClr val="tx1"/>
+                </a:solidFill>
+                <a:latin typeface="Calibri" panose="020F0502020204030204" pitchFamily="34" charset="0"/>
+              </a:defRPr>
+            </a:lvl7pPr>
+            <a:lvl8pPr marL="3429000" indent="-228600" eaLnBrk="0" fontAlgn="base" hangingPunct="0">
+              <a:spcBef>
+                <a:spcPct val="0"/>
+              </a:spcBef>
+              <a:spcAft>
+                <a:spcPct val="0"/>
+              </a:spcAft>
+              <a:defRPr>
+                <a:solidFill>
+                  <a:schemeClr val="tx1"/>
+                </a:solidFill>
+                <a:latin typeface="Calibri" panose="020F0502020204030204" pitchFamily="34" charset="0"/>
+              </a:defRPr>
+            </a:lvl8pPr>
+            <a:lvl9pPr marL="3886200" indent="-228600" eaLnBrk="0" fontAlgn="base" hangingPunct="0">
+              <a:spcBef>
+                <a:spcPct val="0"/>
+              </a:spcBef>
+              <a:spcAft>
+                <a:spcPct val="0"/>
+              </a:spcAft>
+              <a:defRPr>
+                <a:solidFill>
+                  <a:schemeClr val="tx1"/>
+                </a:solidFill>
+                <a:latin typeface="Calibri" panose="020F0502020204030204" pitchFamily="34" charset="0"/>
+              </a:defRPr>
+            </a:lvl9pPr>
+          </a:lstStyle>
+          <a:p>
+            <a:pPr algn="ctr" eaLnBrk="1" hangingPunct="1"/>
+            <a:r>
+              <a:rPr lang="en-US" altLang="en-US" sz="1200" dirty="0">
+                <a:latin typeface="Arial" panose="020B0604020202020204" pitchFamily="34" charset="0"/>
+                <a:ea typeface="Amazon Ember" panose="020B0603020204020204" pitchFamily="34" charset="0"/>
+                <a:cs typeface="Arial" panose="020B0604020202020204" pitchFamily="34" charset="0"/>
+              </a:rPr>
+              <a:t>Security Tooling Account</a:t>
+            </a:r>
+          </a:p>
+        </p:txBody>
+      </p:sp>
+      <p:pic>
+        <p:nvPicPr>
+          <p:cNvPr id="58" name="Graphic 7">
+            <a:extLst>
+              <a:ext uri="{FF2B5EF4-FFF2-40B4-BE49-F238E27FC236}">
+                <a16:creationId xmlns:a16="http://schemas.microsoft.com/office/drawing/2014/main" id="{E8BE64B7-803A-44EA-A5F4-C9A1DC8CBE55}"/>
+              </a:ext>
+            </a:extLst>
+          </p:cNvPr>
+          <p:cNvPicPr>
+            <a:picLocks noChangeAspect="1" noChangeArrowheads="1"/>
+          </p:cNvPicPr>
+          <p:nvPr/>
+        </p:nvPicPr>
+        <p:blipFill>
+          <a:blip r:embed="rId19">
+            <a:extLst>
+              <a:ext uri="{96DAC541-7B7A-43D3-8B79-37D633B846F1}">
+                <asvg:svgBlip xmlns:asvg="http://schemas.microsoft.com/office/drawing/2016/SVG/main" r:embed="rId20"/>
+              </a:ext>
+            </a:extLst>
+          </a:blip>
+          <a:srcRect/>
+          <a:stretch/>
+        </p:blipFill>
+        <p:spPr bwMode="auto">
+          <a:xfrm>
+            <a:off x="3595486" y="4611521"/>
+            <a:ext cx="457200" cy="457200"/>
+          </a:xfrm>
+          <a:prstGeom prst="rect">
+            <a:avLst/>
+          </a:prstGeom>
+          <a:noFill/>
+          <a:ln>
+            <a:noFill/>
+          </a:ln>
+          <a:extLst>
+            <a:ext uri="{909E8E84-426E-40DD-AFC4-6F175D3DCCD1}">
+              <a14:hiddenFill xmlns:a14="http://schemas.microsoft.com/office/drawing/2010/main">
+                <a:solidFill>
+                  <a:srgbClr val="FFFFFF"/>
+                </a:solidFill>
+              </a14:hiddenFill>
+            </a:ext>
+            <a:ext uri="{91240B29-F687-4F45-9708-019B960494DF}">
+              <a14:hiddenLine xmlns:a14="http://schemas.microsoft.com/office/drawing/2010/main" w="9525">
+                <a:solidFill>
+                  <a:srgbClr val="000000"/>
+                </a:solidFill>
+                <a:miter lim="800000"/>
+                <a:headEnd/>
+                <a:tailEnd/>
+              </a14:hiddenLine>
+            </a:ext>
+          </a:extLst>
+        </p:spPr>
+      </p:pic>
+      <p:sp>
+        <p:nvSpPr>
+          <p:cNvPr id="60" name="TextBox 9">
+            <a:extLst>
+              <a:ext uri="{FF2B5EF4-FFF2-40B4-BE49-F238E27FC236}">
+                <a16:creationId xmlns:a16="http://schemas.microsoft.com/office/drawing/2014/main" id="{227F0B4C-FE1F-4A7B-AC4B-482470B3268A}"/>
+              </a:ext>
+            </a:extLst>
+          </p:cNvPr>
+          <p:cNvSpPr txBox="1">
+            <a:spLocks noChangeArrowheads="1"/>
+          </p:cNvSpPr>
+          <p:nvPr/>
+        </p:nvSpPr>
+        <p:spPr bwMode="auto">
+          <a:xfrm>
+            <a:off x="3169317" y="5068721"/>
+            <a:ext cx="1297877" cy="461665"/>
+          </a:xfrm>
+          <a:prstGeom prst="rect">
+            <a:avLst/>
+          </a:prstGeom>
+          <a:noFill/>
+          <a:ln>
+            <a:noFill/>
+          </a:ln>
+          <a:extLst>
+            <a:ext uri="{909E8E84-426E-40DD-AFC4-6F175D3DCCD1}">
+              <a14:hiddenFill xmlns:a14="http://schemas.microsoft.com/office/drawing/2010/main">
+                <a:solidFill>
+                  <a:srgbClr val="FFFFFF"/>
+                </a:solidFill>
+              </a14:hiddenFill>
+            </a:ext>
+            <a:ext uri="{91240B29-F687-4F45-9708-019B960494DF}">
+              <a14:hiddenLine xmlns:a14="http://schemas.microsoft.com/office/drawing/2010/main" w="9525">
+                <a:solidFill>
+                  <a:srgbClr val="000000"/>
+                </a:solidFill>
+                <a:miter lim="800000"/>
+                <a:headEnd/>
+                <a:tailEnd/>
+              </a14:hiddenLine>
+            </a:ext>
+          </a:extLst>
+        </p:spPr>
+        <p:txBody>
+          <a:bodyPr wrap="square">
+            <a:spAutoFit/>
+          </a:bodyPr>
+          <a:lstStyle>
+            <a:lvl1pPr>
+              <a:defRPr>
+                <a:solidFill>
+                  <a:schemeClr val="tx1"/>
+                </a:solidFill>
+                <a:latin typeface="Calibri" panose="020F0502020204030204" pitchFamily="34" charset="0"/>
+              </a:defRPr>
+            </a:lvl1pPr>
+            <a:lvl2pPr marL="742950" indent="-285750">
+              <a:defRPr>
+                <a:solidFill>
+                  <a:schemeClr val="tx1"/>
+                </a:solidFill>
+                <a:latin typeface="Calibri" panose="020F0502020204030204" pitchFamily="34" charset="0"/>
+              </a:defRPr>
+            </a:lvl2pPr>
+            <a:lvl3pPr marL="1143000" indent="-228600">
+              <a:defRPr>
+                <a:solidFill>
+                  <a:schemeClr val="tx1"/>
+                </a:solidFill>
+                <a:latin typeface="Calibri" panose="020F0502020204030204" pitchFamily="34" charset="0"/>
+              </a:defRPr>
+            </a:lvl3pPr>
+            <a:lvl4pPr marL="1600200" indent="-228600">
+              <a:defRPr>
+                <a:solidFill>
+                  <a:schemeClr val="tx1"/>
+                </a:solidFill>
+                <a:latin typeface="Calibri" panose="020F0502020204030204" pitchFamily="34" charset="0"/>
+              </a:defRPr>
+            </a:lvl4pPr>
+            <a:lvl5pPr marL="2057400" indent="-228600">
+              <a:defRPr>
+                <a:solidFill>
+                  <a:schemeClr val="tx1"/>
+                </a:solidFill>
+                <a:latin typeface="Calibri" panose="020F0502020204030204" pitchFamily="34" charset="0"/>
+              </a:defRPr>
+            </a:lvl5pPr>
+            <a:lvl6pPr marL="2514600" indent="-228600" eaLnBrk="0" fontAlgn="base" hangingPunct="0">
+              <a:spcBef>
+                <a:spcPct val="0"/>
+              </a:spcBef>
+              <a:spcAft>
+                <a:spcPct val="0"/>
+              </a:spcAft>
+              <a:defRPr>
+                <a:solidFill>
+                  <a:schemeClr val="tx1"/>
+                </a:solidFill>
+                <a:latin typeface="Calibri" panose="020F0502020204030204" pitchFamily="34" charset="0"/>
+              </a:defRPr>
+            </a:lvl6pPr>
+            <a:lvl7pPr marL="2971800" indent="-228600" eaLnBrk="0" fontAlgn="base" hangingPunct="0">
+              <a:spcBef>
+                <a:spcPct val="0"/>
+              </a:spcBef>
+              <a:spcAft>
+                <a:spcPct val="0"/>
+              </a:spcAft>
+              <a:defRPr>
+                <a:solidFill>
+                  <a:schemeClr val="tx1"/>
+                </a:solidFill>
+                <a:latin typeface="Calibri" panose="020F0502020204030204" pitchFamily="34" charset="0"/>
+              </a:defRPr>
+            </a:lvl7pPr>
+            <a:lvl8pPr marL="3429000" indent="-228600" eaLnBrk="0" fontAlgn="base" hangingPunct="0">
+              <a:spcBef>
+                <a:spcPct val="0"/>
+              </a:spcBef>
+              <a:spcAft>
+                <a:spcPct val="0"/>
+              </a:spcAft>
+              <a:defRPr>
+                <a:solidFill>
+                  <a:schemeClr val="tx1"/>
+                </a:solidFill>
+                <a:latin typeface="Calibri" panose="020F0502020204030204" pitchFamily="34" charset="0"/>
+              </a:defRPr>
+            </a:lvl8pPr>
+            <a:lvl9pPr marL="3886200" indent="-228600" eaLnBrk="0" fontAlgn="base" hangingPunct="0">
+              <a:spcBef>
+                <a:spcPct val="0"/>
+              </a:spcBef>
+              <a:spcAft>
+                <a:spcPct val="0"/>
+              </a:spcAft>
+              <a:defRPr>
+                <a:solidFill>
+                  <a:schemeClr val="tx1"/>
+                </a:solidFill>
+                <a:latin typeface="Calibri" panose="020F0502020204030204" pitchFamily="34" charset="0"/>
+              </a:defRPr>
+            </a:lvl9pPr>
+          </a:lstStyle>
+          <a:p>
+            <a:pPr algn="ctr" eaLnBrk="1" hangingPunct="1"/>
+            <a:r>
+              <a:rPr lang="en-US" altLang="en-US" sz="1200" dirty="0">
+                <a:latin typeface="Arial" panose="020B0604020202020204" pitchFamily="34" charset="0"/>
+                <a:ea typeface="Amazon Ember" panose="020B0603020204020204" pitchFamily="34" charset="0"/>
+                <a:cs typeface="Arial" panose="020B0604020202020204" pitchFamily="34" charset="0"/>
+              </a:rPr>
+              <a:t>Log Archive Account</a:t>
+            </a:r>
+          </a:p>
+        </p:txBody>
+      </p:sp>
+      <p:pic>
+        <p:nvPicPr>
+          <p:cNvPr id="62" name="Graphic 17">
+            <a:extLst>
+              <a:ext uri="{FF2B5EF4-FFF2-40B4-BE49-F238E27FC236}">
+                <a16:creationId xmlns:a16="http://schemas.microsoft.com/office/drawing/2014/main" id="{5B46F783-7876-4B1E-9206-4C989590AF78}"/>
+              </a:ext>
+            </a:extLst>
+          </p:cNvPr>
+          <p:cNvPicPr>
+            <a:picLocks noChangeAspect="1" noChangeArrowheads="1"/>
+          </p:cNvPicPr>
+          <p:nvPr/>
+        </p:nvPicPr>
+        <p:blipFill>
+          <a:blip r:embed="rId21">
+            <a:extLst>
+              <a:ext uri="{96DAC541-7B7A-43D3-8B79-37D633B846F1}">
+                <asvg:svgBlip xmlns:asvg="http://schemas.microsoft.com/office/drawing/2016/SVG/main" r:embed="rId22"/>
+              </a:ext>
+            </a:extLst>
+          </a:blip>
+          <a:srcRect/>
+          <a:stretch/>
+        </p:blipFill>
+        <p:spPr bwMode="auto">
+          <a:xfrm>
+            <a:off x="2753438" y="2637865"/>
+            <a:ext cx="457200" cy="457200"/>
+          </a:xfrm>
+          <a:prstGeom prst="rect">
+            <a:avLst/>
+          </a:prstGeom>
+          <a:noFill/>
+          <a:ln>
+            <a:noFill/>
+          </a:ln>
+          <a:extLst>
+            <a:ext uri="{909E8E84-426E-40DD-AFC4-6F175D3DCCD1}">
+              <a14:hiddenFill xmlns:a14="http://schemas.microsoft.com/office/drawing/2010/main">
+                <a:solidFill>
+                  <a:srgbClr val="FFFFFF"/>
+                </a:solidFill>
+              </a14:hiddenFill>
+            </a:ext>
+            <a:ext uri="{91240B29-F687-4F45-9708-019B960494DF}">
+              <a14:hiddenLine xmlns:a14="http://schemas.microsoft.com/office/drawing/2010/main" w="9525">
+                <a:solidFill>
+                  <a:srgbClr val="000000"/>
+                </a:solidFill>
+                <a:miter lim="800000"/>
+                <a:headEnd/>
+                <a:tailEnd/>
+              </a14:hiddenLine>
+            </a:ext>
+          </a:extLst>
+        </p:spPr>
+      </p:pic>
+      <p:sp>
+        <p:nvSpPr>
+          <p:cNvPr id="63" name="TextBox 9">
+            <a:extLst>
+              <a:ext uri="{FF2B5EF4-FFF2-40B4-BE49-F238E27FC236}">
+                <a16:creationId xmlns:a16="http://schemas.microsoft.com/office/drawing/2014/main" id="{173BC12B-099F-457C-A257-F68515729034}"/>
+              </a:ext>
+            </a:extLst>
+          </p:cNvPr>
+          <p:cNvSpPr txBox="1">
+            <a:spLocks noChangeArrowheads="1"/>
+          </p:cNvSpPr>
+          <p:nvPr/>
+        </p:nvSpPr>
+        <p:spPr bwMode="auto">
+          <a:xfrm>
+            <a:off x="2363605" y="3085572"/>
+            <a:ext cx="1297877" cy="276999"/>
+          </a:xfrm>
+          <a:prstGeom prst="rect">
+            <a:avLst/>
+          </a:prstGeom>
+          <a:noFill/>
+          <a:ln>
+            <a:noFill/>
+          </a:ln>
+          <a:extLst>
+            <a:ext uri="{909E8E84-426E-40DD-AFC4-6F175D3DCCD1}">
+              <a14:hiddenFill xmlns:a14="http://schemas.microsoft.com/office/drawing/2010/main">
+                <a:solidFill>
+                  <a:srgbClr val="FFFFFF"/>
+                </a:solidFill>
+              </a14:hiddenFill>
+            </a:ext>
+            <a:ext uri="{91240B29-F687-4F45-9708-019B960494DF}">
+              <a14:hiddenLine xmlns:a14="http://schemas.microsoft.com/office/drawing/2010/main" w="9525">
+                <a:solidFill>
+                  <a:srgbClr val="000000"/>
+                </a:solidFill>
+                <a:miter lim="800000"/>
+                <a:headEnd/>
+                <a:tailEnd/>
+              </a14:hiddenLine>
+            </a:ext>
+          </a:extLst>
+        </p:spPr>
+        <p:txBody>
+          <a:bodyPr wrap="square">
+            <a:spAutoFit/>
+          </a:bodyPr>
+          <a:lstStyle>
+            <a:lvl1pPr>
+              <a:defRPr>
+                <a:solidFill>
+                  <a:schemeClr val="tx1"/>
+                </a:solidFill>
+                <a:latin typeface="Calibri" panose="020F0502020204030204" pitchFamily="34" charset="0"/>
+              </a:defRPr>
+            </a:lvl1pPr>
+            <a:lvl2pPr marL="742950" indent="-285750">
+              <a:defRPr>
+                <a:solidFill>
+                  <a:schemeClr val="tx1"/>
+                </a:solidFill>
+                <a:latin typeface="Calibri" panose="020F0502020204030204" pitchFamily="34" charset="0"/>
+              </a:defRPr>
+            </a:lvl2pPr>
+            <a:lvl3pPr marL="1143000" indent="-228600">
+              <a:defRPr>
+                <a:solidFill>
+                  <a:schemeClr val="tx1"/>
+                </a:solidFill>
+                <a:latin typeface="Calibri" panose="020F0502020204030204" pitchFamily="34" charset="0"/>
+              </a:defRPr>
+            </a:lvl3pPr>
+            <a:lvl4pPr marL="1600200" indent="-228600">
+              <a:defRPr>
+                <a:solidFill>
+                  <a:schemeClr val="tx1"/>
+                </a:solidFill>
+                <a:latin typeface="Calibri" panose="020F0502020204030204" pitchFamily="34" charset="0"/>
+              </a:defRPr>
+            </a:lvl4pPr>
+            <a:lvl5pPr marL="2057400" indent="-228600">
+              <a:defRPr>
+                <a:solidFill>
+                  <a:schemeClr val="tx1"/>
+                </a:solidFill>
+                <a:latin typeface="Calibri" panose="020F0502020204030204" pitchFamily="34" charset="0"/>
+              </a:defRPr>
+            </a:lvl5pPr>
+            <a:lvl6pPr marL="2514600" indent="-228600" eaLnBrk="0" fontAlgn="base" hangingPunct="0">
+              <a:spcBef>
+                <a:spcPct val="0"/>
+              </a:spcBef>
+              <a:spcAft>
+                <a:spcPct val="0"/>
+              </a:spcAft>
+              <a:defRPr>
+                <a:solidFill>
+                  <a:schemeClr val="tx1"/>
+                </a:solidFill>
+                <a:latin typeface="Calibri" panose="020F0502020204030204" pitchFamily="34" charset="0"/>
+              </a:defRPr>
+            </a:lvl6pPr>
+            <a:lvl7pPr marL="2971800" indent="-228600" eaLnBrk="0" fontAlgn="base" hangingPunct="0">
+              <a:spcBef>
+                <a:spcPct val="0"/>
+              </a:spcBef>
+              <a:spcAft>
+                <a:spcPct val="0"/>
+              </a:spcAft>
+              <a:defRPr>
+                <a:solidFill>
+                  <a:schemeClr val="tx1"/>
+                </a:solidFill>
+                <a:latin typeface="Calibri" panose="020F0502020204030204" pitchFamily="34" charset="0"/>
+              </a:defRPr>
+            </a:lvl7pPr>
+            <a:lvl8pPr marL="3429000" indent="-228600" eaLnBrk="0" fontAlgn="base" hangingPunct="0">
+              <a:spcBef>
+                <a:spcPct val="0"/>
+              </a:spcBef>
+              <a:spcAft>
+                <a:spcPct val="0"/>
+              </a:spcAft>
+              <a:defRPr>
+                <a:solidFill>
+                  <a:schemeClr val="tx1"/>
+                </a:solidFill>
+                <a:latin typeface="Calibri" panose="020F0502020204030204" pitchFamily="34" charset="0"/>
+              </a:defRPr>
+            </a:lvl8pPr>
+            <a:lvl9pPr marL="3886200" indent="-228600" eaLnBrk="0" fontAlgn="base" hangingPunct="0">
+              <a:spcBef>
+                <a:spcPct val="0"/>
+              </a:spcBef>
+              <a:spcAft>
+                <a:spcPct val="0"/>
+              </a:spcAft>
+              <a:defRPr>
+                <a:solidFill>
+                  <a:schemeClr val="tx1"/>
+                </a:solidFill>
+                <a:latin typeface="Calibri" panose="020F0502020204030204" pitchFamily="34" charset="0"/>
+              </a:defRPr>
+            </a:lvl9pPr>
+          </a:lstStyle>
+          <a:p>
+            <a:pPr algn="ctr" eaLnBrk="1" hangingPunct="1"/>
+            <a:r>
+              <a:rPr lang="en-US" altLang="en-US" sz="1200" dirty="0">
+                <a:latin typeface="Arial" panose="020B0604020202020204" pitchFamily="34" charset="0"/>
+                <a:ea typeface="Amazon Ember" panose="020B0603020204020204" pitchFamily="34" charset="0"/>
+                <a:cs typeface="Arial" panose="020B0604020202020204" pitchFamily="34" charset="0"/>
+              </a:rPr>
+              <a:t>Security OU</a:t>
+            </a:r>
+          </a:p>
+        </p:txBody>
+      </p:sp>
+      <p:cxnSp>
+        <p:nvCxnSpPr>
+          <p:cNvPr id="3" name="Straight Connector 2">
+            <a:extLst>
+              <a:ext uri="{FF2B5EF4-FFF2-40B4-BE49-F238E27FC236}">
+                <a16:creationId xmlns:a16="http://schemas.microsoft.com/office/drawing/2014/main" id="{1C0EB7DC-01E3-4DC6-BFD5-9423426A6B79}"/>
+              </a:ext>
+            </a:extLst>
+          </p:cNvPr>
+          <p:cNvCxnSpPr>
+            <a:cxnSpLocks/>
+            <a:stCxn id="73" idx="2"/>
+            <a:endCxn id="62" idx="0"/>
+          </p:cNvCxnSpPr>
+          <p:nvPr/>
+        </p:nvCxnSpPr>
+        <p:spPr>
+          <a:xfrm rot="5400000">
+            <a:off x="2960231" y="2108172"/>
+            <a:ext cx="551500" cy="507886"/>
+          </a:xfrm>
+          <a:prstGeom prst="bentConnector3">
+            <a:avLst>
+              <a:gd name="adj1" fmla="val 64023"/>
+            </a:avLst>
+          </a:prstGeom>
+          <a:ln w="19050">
+            <a:solidFill>
+              <a:srgbClr val="B0084D"/>
+            </a:solidFill>
+            <a:tailEnd type="none"/>
+          </a:ln>
+        </p:spPr>
+        <p:style>
+          <a:lnRef idx="1">
+            <a:schemeClr val="accent1"/>
+          </a:lnRef>
+          <a:fillRef idx="0">
+            <a:schemeClr val="accent1"/>
+          </a:fillRef>
+          <a:effectRef idx="0">
+            <a:schemeClr val="accent1"/>
+          </a:effectRef>
+          <a:fontRef idx="minor">
+            <a:schemeClr val="tx1"/>
+          </a:fontRef>
+        </p:style>
+      </p:cxnSp>
+      <p:cxnSp>
+        <p:nvCxnSpPr>
+          <p:cNvPr id="65" name="Straight Connector 2">
+            <a:extLst>
+              <a:ext uri="{FF2B5EF4-FFF2-40B4-BE49-F238E27FC236}">
+                <a16:creationId xmlns:a16="http://schemas.microsoft.com/office/drawing/2014/main" id="{87FFCAE2-23C1-4D8F-9298-C25198F167C4}"/>
+              </a:ext>
+            </a:extLst>
+          </p:cNvPr>
+          <p:cNvCxnSpPr>
+            <a:cxnSpLocks/>
+            <a:stCxn id="63" idx="2"/>
+            <a:endCxn id="56" idx="1"/>
+          </p:cNvCxnSpPr>
+          <p:nvPr/>
+        </p:nvCxnSpPr>
+        <p:spPr>
+          <a:xfrm rot="16200000" flipH="1">
+            <a:off x="3143031" y="3232084"/>
+            <a:ext cx="321969" cy="582942"/>
+          </a:xfrm>
+          <a:prstGeom prst="bentConnector2">
+            <a:avLst/>
+          </a:prstGeom>
+          <a:ln w="19050">
+            <a:solidFill>
+              <a:srgbClr val="B0084D"/>
+            </a:solidFill>
+            <a:tailEnd type="none"/>
+          </a:ln>
+        </p:spPr>
+        <p:style>
+          <a:lnRef idx="1">
+            <a:schemeClr val="accent1"/>
+          </a:lnRef>
+          <a:fillRef idx="0">
+            <a:schemeClr val="accent1"/>
+          </a:fillRef>
+          <a:effectRef idx="0">
+            <a:schemeClr val="accent1"/>
+          </a:effectRef>
+          <a:fontRef idx="minor">
+            <a:schemeClr val="tx1"/>
+          </a:fontRef>
+        </p:style>
+      </p:cxnSp>
+      <p:cxnSp>
+        <p:nvCxnSpPr>
+          <p:cNvPr id="67" name="Straight Connector 2">
+            <a:extLst>
+              <a:ext uri="{FF2B5EF4-FFF2-40B4-BE49-F238E27FC236}">
+                <a16:creationId xmlns:a16="http://schemas.microsoft.com/office/drawing/2014/main" id="{E73545F5-938C-4883-A013-0AB1FC87E9A9}"/>
+              </a:ext>
+            </a:extLst>
+          </p:cNvPr>
+          <p:cNvCxnSpPr>
+            <a:cxnSpLocks/>
+            <a:stCxn id="63" idx="2"/>
+            <a:endCxn id="58" idx="1"/>
+          </p:cNvCxnSpPr>
+          <p:nvPr/>
+        </p:nvCxnSpPr>
+        <p:spPr>
+          <a:xfrm rot="16200000" flipH="1">
+            <a:off x="2565240" y="3809875"/>
+            <a:ext cx="1477550" cy="582942"/>
+          </a:xfrm>
+          <a:prstGeom prst="bentConnector2">
+            <a:avLst/>
+          </a:prstGeom>
+          <a:ln w="19050">
+            <a:solidFill>
+              <a:srgbClr val="B0084D"/>
+            </a:solidFill>
+            <a:tailEnd type="none"/>
+          </a:ln>
+        </p:spPr>
+        <p:style>
+          <a:lnRef idx="1">
+            <a:schemeClr val="accent1"/>
+          </a:lnRef>
+          <a:fillRef idx="0">
+            <a:schemeClr val="accent1"/>
+          </a:fillRef>
+          <a:effectRef idx="0">
+            <a:schemeClr val="accent1"/>
+          </a:effectRef>
+          <a:fontRef idx="minor">
+            <a:schemeClr val="tx1"/>
+          </a:fontRef>
+        </p:style>
+      </p:cxnSp>
+      <p:sp>
+        <p:nvSpPr>
+          <p:cNvPr id="8" name="Rectangle 7">
+            <a:extLst>
+              <a:ext uri="{FF2B5EF4-FFF2-40B4-BE49-F238E27FC236}">
+                <a16:creationId xmlns:a16="http://schemas.microsoft.com/office/drawing/2014/main" id="{2B83A781-CA3E-4A6D-873B-053BAF393CAC}"/>
+              </a:ext>
+            </a:extLst>
+          </p:cNvPr>
+          <p:cNvSpPr/>
+          <p:nvPr/>
+        </p:nvSpPr>
+        <p:spPr>
+          <a:xfrm>
+            <a:off x="5631977" y="3185093"/>
+            <a:ext cx="1097315" cy="995671"/>
+          </a:xfrm>
+          <a:prstGeom prst="rect">
+            <a:avLst/>
+          </a:prstGeom>
+          <a:noFill/>
+          <a:ln w="19050">
+            <a:solidFill>
+              <a:srgbClr val="B0084D"/>
+            </a:solidFill>
+          </a:ln>
+        </p:spPr>
+        <p:style>
+          <a:lnRef idx="2">
+            <a:schemeClr val="accent1">
+              <a:shade val="50000"/>
+            </a:schemeClr>
+          </a:lnRef>
+          <a:fillRef idx="1">
+            <a:schemeClr val="accent1"/>
+          </a:fillRef>
+          <a:effectRef idx="0">
+            <a:schemeClr val="accent1"/>
+          </a:effectRef>
+          <a:fontRef idx="minor">
+            <a:schemeClr val="lt1"/>
+          </a:fontRef>
+        </p:style>
+        <p:txBody>
+          <a:bodyPr rtlCol="0" anchor="ctr"/>
+          <a:lstStyle/>
+          <a:p>
+            <a:pPr algn="ctr"/>
+            <a:endParaRPr lang="en-US"/>
+          </a:p>
+        </p:txBody>
+      </p:sp>
+      <p:pic>
+        <p:nvPicPr>
+          <p:cNvPr id="73" name="Graphic 17">
+            <a:extLst>
+              <a:ext uri="{FF2B5EF4-FFF2-40B4-BE49-F238E27FC236}">
+                <a16:creationId xmlns:a16="http://schemas.microsoft.com/office/drawing/2014/main" id="{82A8072A-DA3E-4426-9F38-ADEE713DCF4C}"/>
+              </a:ext>
+            </a:extLst>
+          </p:cNvPr>
+          <p:cNvPicPr>
+            <a:picLocks noChangeAspect="1" noChangeArrowheads="1"/>
+          </p:cNvPicPr>
+          <p:nvPr/>
+        </p:nvPicPr>
+        <p:blipFill>
+          <a:blip r:embed="rId21">
+            <a:extLst>
+              <a:ext uri="{96DAC541-7B7A-43D3-8B79-37D633B846F1}">
+                <asvg:svgBlip xmlns:asvg="http://schemas.microsoft.com/office/drawing/2016/SVG/main" r:embed="rId22"/>
+              </a:ext>
+            </a:extLst>
+          </a:blip>
+          <a:srcRect/>
+          <a:stretch/>
+        </p:blipFill>
+        <p:spPr bwMode="auto">
+          <a:xfrm>
+            <a:off x="3261324" y="1629165"/>
+            <a:ext cx="457200" cy="457200"/>
+          </a:xfrm>
+          <a:prstGeom prst="rect">
+            <a:avLst/>
+          </a:prstGeom>
+          <a:noFill/>
+          <a:ln>
+            <a:noFill/>
+          </a:ln>
+          <a:extLst>
+            <a:ext uri="{909E8E84-426E-40DD-AFC4-6F175D3DCCD1}">
+              <a14:hiddenFill xmlns:a14="http://schemas.microsoft.com/office/drawing/2010/main">
+                <a:solidFill>
+                  <a:srgbClr val="FFFFFF"/>
+                </a:solidFill>
+              </a14:hiddenFill>
+            </a:ext>
+            <a:ext uri="{91240B29-F687-4F45-9708-019B960494DF}">
+              <a14:hiddenLine xmlns:a14="http://schemas.microsoft.com/office/drawing/2010/main" w="9525">
+                <a:solidFill>
+                  <a:srgbClr val="000000"/>
+                </a:solidFill>
+                <a:miter lim="800000"/>
+                <a:headEnd/>
+                <a:tailEnd/>
+              </a14:hiddenLine>
+            </a:ext>
+          </a:extLst>
+        </p:spPr>
+      </p:pic>
+      <p:sp>
+        <p:nvSpPr>
+          <p:cNvPr id="79" name="TextBox 9">
+            <a:extLst>
+              <a:ext uri="{FF2B5EF4-FFF2-40B4-BE49-F238E27FC236}">
+                <a16:creationId xmlns:a16="http://schemas.microsoft.com/office/drawing/2014/main" id="{31875334-D4C8-4965-AD25-88A5E4F0571F}"/>
+              </a:ext>
+            </a:extLst>
+          </p:cNvPr>
+          <p:cNvSpPr txBox="1">
+            <a:spLocks noChangeArrowheads="1"/>
+          </p:cNvSpPr>
+          <p:nvPr/>
+        </p:nvSpPr>
+        <p:spPr bwMode="auto">
+          <a:xfrm>
+            <a:off x="3520222" y="1570781"/>
+            <a:ext cx="1022495" cy="276999"/>
+          </a:xfrm>
+          <a:prstGeom prst="rect">
+            <a:avLst/>
+          </a:prstGeom>
+          <a:noFill/>
+          <a:ln>
+            <a:noFill/>
+          </a:ln>
+          <a:extLst>
+            <a:ext uri="{909E8E84-426E-40DD-AFC4-6F175D3DCCD1}">
+              <a14:hiddenFill xmlns:a14="http://schemas.microsoft.com/office/drawing/2010/main">
+                <a:solidFill>
+                  <a:srgbClr val="FFFFFF"/>
+                </a:solidFill>
+              </a14:hiddenFill>
+            </a:ext>
+            <a:ext uri="{91240B29-F687-4F45-9708-019B960494DF}">
+              <a14:hiddenLine xmlns:a14="http://schemas.microsoft.com/office/drawing/2010/main" w="9525">
+                <a:solidFill>
+                  <a:srgbClr val="000000"/>
+                </a:solidFill>
+                <a:miter lim="800000"/>
+                <a:headEnd/>
+                <a:tailEnd/>
+              </a14:hiddenLine>
+            </a:ext>
+          </a:extLst>
+        </p:spPr>
+        <p:txBody>
+          <a:bodyPr wrap="square">
+            <a:spAutoFit/>
+          </a:bodyPr>
+          <a:lstStyle>
+            <a:lvl1pPr>
+              <a:defRPr>
+                <a:solidFill>
+                  <a:schemeClr val="tx1"/>
+                </a:solidFill>
+                <a:latin typeface="Calibri" panose="020F0502020204030204" pitchFamily="34" charset="0"/>
+              </a:defRPr>
+            </a:lvl1pPr>
+            <a:lvl2pPr marL="742950" indent="-285750">
+              <a:defRPr>
+                <a:solidFill>
+                  <a:schemeClr val="tx1"/>
+                </a:solidFill>
+                <a:latin typeface="Calibri" panose="020F0502020204030204" pitchFamily="34" charset="0"/>
+              </a:defRPr>
+            </a:lvl2pPr>
+            <a:lvl3pPr marL="1143000" indent="-228600">
+              <a:defRPr>
+                <a:solidFill>
+                  <a:schemeClr val="tx1"/>
+                </a:solidFill>
+                <a:latin typeface="Calibri" panose="020F0502020204030204" pitchFamily="34" charset="0"/>
+              </a:defRPr>
+            </a:lvl3pPr>
+            <a:lvl4pPr marL="1600200" indent="-228600">
+              <a:defRPr>
+                <a:solidFill>
+                  <a:schemeClr val="tx1"/>
+                </a:solidFill>
+                <a:latin typeface="Calibri" panose="020F0502020204030204" pitchFamily="34" charset="0"/>
+              </a:defRPr>
+            </a:lvl4pPr>
+            <a:lvl5pPr marL="2057400" indent="-228600">
+              <a:defRPr>
+                <a:solidFill>
+                  <a:schemeClr val="tx1"/>
+                </a:solidFill>
+                <a:latin typeface="Calibri" panose="020F0502020204030204" pitchFamily="34" charset="0"/>
+              </a:defRPr>
+            </a:lvl5pPr>
+            <a:lvl6pPr marL="2514600" indent="-228600" eaLnBrk="0" fontAlgn="base" hangingPunct="0">
+              <a:spcBef>
+                <a:spcPct val="0"/>
+              </a:spcBef>
+              <a:spcAft>
+                <a:spcPct val="0"/>
+              </a:spcAft>
+              <a:defRPr>
+                <a:solidFill>
+                  <a:schemeClr val="tx1"/>
+                </a:solidFill>
+                <a:latin typeface="Calibri" panose="020F0502020204030204" pitchFamily="34" charset="0"/>
+              </a:defRPr>
+            </a:lvl6pPr>
+            <a:lvl7pPr marL="2971800" indent="-228600" eaLnBrk="0" fontAlgn="base" hangingPunct="0">
+              <a:spcBef>
+                <a:spcPct val="0"/>
+              </a:spcBef>
+              <a:spcAft>
+                <a:spcPct val="0"/>
+              </a:spcAft>
+              <a:defRPr>
+                <a:solidFill>
+                  <a:schemeClr val="tx1"/>
+                </a:solidFill>
+                <a:latin typeface="Calibri" panose="020F0502020204030204" pitchFamily="34" charset="0"/>
+              </a:defRPr>
+            </a:lvl7pPr>
+            <a:lvl8pPr marL="3429000" indent="-228600" eaLnBrk="0" fontAlgn="base" hangingPunct="0">
+              <a:spcBef>
+                <a:spcPct val="0"/>
+              </a:spcBef>
+              <a:spcAft>
+                <a:spcPct val="0"/>
+              </a:spcAft>
+              <a:defRPr>
+                <a:solidFill>
+                  <a:schemeClr val="tx1"/>
+                </a:solidFill>
+                <a:latin typeface="Calibri" panose="020F0502020204030204" pitchFamily="34" charset="0"/>
+              </a:defRPr>
+            </a:lvl8pPr>
+            <a:lvl9pPr marL="3886200" indent="-228600" eaLnBrk="0" fontAlgn="base" hangingPunct="0">
+              <a:spcBef>
+                <a:spcPct val="0"/>
+              </a:spcBef>
+              <a:spcAft>
+                <a:spcPct val="0"/>
+              </a:spcAft>
+              <a:defRPr>
+                <a:solidFill>
+                  <a:schemeClr val="tx1"/>
+                </a:solidFill>
+                <a:latin typeface="Calibri" panose="020F0502020204030204" pitchFamily="34" charset="0"/>
+              </a:defRPr>
+            </a:lvl9pPr>
+          </a:lstStyle>
+          <a:p>
+            <a:pPr algn="ctr" eaLnBrk="1" hangingPunct="1"/>
+            <a:r>
+              <a:rPr lang="en-US" altLang="en-US" sz="1200" dirty="0">
+                <a:latin typeface="Arial" panose="020B0604020202020204" pitchFamily="34" charset="0"/>
+                <a:ea typeface="Amazon Ember" panose="020B0603020204020204" pitchFamily="34" charset="0"/>
+                <a:cs typeface="Arial" panose="020B0604020202020204" pitchFamily="34" charset="0"/>
+              </a:rPr>
+              <a:t>Root OU</a:t>
+            </a:r>
+          </a:p>
+        </p:txBody>
+      </p:sp>
+      <p:cxnSp>
+        <p:nvCxnSpPr>
+          <p:cNvPr id="80" name="Straight Connector 2">
+            <a:extLst>
+              <a:ext uri="{FF2B5EF4-FFF2-40B4-BE49-F238E27FC236}">
+                <a16:creationId xmlns:a16="http://schemas.microsoft.com/office/drawing/2014/main" id="{8E454942-0C0F-4B0D-B018-C6CC5CA37E2C}"/>
+              </a:ext>
+            </a:extLst>
+          </p:cNvPr>
+          <p:cNvCxnSpPr>
+            <a:cxnSpLocks/>
+            <a:stCxn id="73" idx="1"/>
+            <a:endCxn id="40" idx="3"/>
+          </p:cNvCxnSpPr>
+          <p:nvPr/>
+        </p:nvCxnSpPr>
+        <p:spPr>
+          <a:xfrm rot="10800000" flipV="1">
+            <a:off x="2758888" y="1857764"/>
+            <a:ext cx="502436" cy="199"/>
+          </a:xfrm>
+          <a:prstGeom prst="bentConnector3">
+            <a:avLst>
+              <a:gd name="adj1" fmla="val 50000"/>
+            </a:avLst>
+          </a:prstGeom>
+          <a:ln w="19050">
+            <a:solidFill>
+              <a:srgbClr val="B0084D"/>
+            </a:solidFill>
+            <a:tailEnd type="none"/>
+          </a:ln>
+        </p:spPr>
+        <p:style>
+          <a:lnRef idx="1">
+            <a:schemeClr val="accent1"/>
+          </a:lnRef>
+          <a:fillRef idx="0">
+            <a:schemeClr val="accent1"/>
+          </a:fillRef>
+          <a:effectRef idx="0">
+            <a:schemeClr val="accent1"/>
+          </a:effectRef>
+          <a:fontRef idx="minor">
+            <a:schemeClr val="tx1"/>
+          </a:fontRef>
+        </p:style>
+      </p:cxnSp>
+      <p:cxnSp>
+        <p:nvCxnSpPr>
+          <p:cNvPr id="84" name="Straight Connector 2">
+            <a:extLst>
+              <a:ext uri="{FF2B5EF4-FFF2-40B4-BE49-F238E27FC236}">
+                <a16:creationId xmlns:a16="http://schemas.microsoft.com/office/drawing/2014/main" id="{463376FC-C980-4043-9D95-331FAF17648B}"/>
+              </a:ext>
+            </a:extLst>
+          </p:cNvPr>
+          <p:cNvCxnSpPr>
+            <a:cxnSpLocks/>
+            <a:stCxn id="73" idx="3"/>
+            <a:endCxn id="54" idx="0"/>
+          </p:cNvCxnSpPr>
+          <p:nvPr/>
+        </p:nvCxnSpPr>
+        <p:spPr>
+          <a:xfrm>
+            <a:off x="3718524" y="1857765"/>
+            <a:ext cx="427782" cy="293098"/>
+          </a:xfrm>
+          <a:prstGeom prst="bentConnector2">
+            <a:avLst/>
+          </a:prstGeom>
+          <a:ln w="19050">
+            <a:solidFill>
+              <a:srgbClr val="B0084D"/>
+            </a:solidFill>
+            <a:tailEnd type="none"/>
+          </a:ln>
+        </p:spPr>
+        <p:style>
+          <a:lnRef idx="1">
+            <a:schemeClr val="accent1"/>
+          </a:lnRef>
+          <a:fillRef idx="0">
+            <a:schemeClr val="accent1"/>
+          </a:fillRef>
+          <a:effectRef idx="0">
+            <a:schemeClr val="accent1"/>
+          </a:effectRef>
+          <a:fontRef idx="minor">
+            <a:schemeClr val="tx1"/>
+          </a:fontRef>
+        </p:style>
+      </p:cxnSp>
+      <p:cxnSp>
+        <p:nvCxnSpPr>
+          <p:cNvPr id="85" name="Straight Arrow Connector 84">
+            <a:extLst>
+              <a:ext uri="{FF2B5EF4-FFF2-40B4-BE49-F238E27FC236}">
+                <a16:creationId xmlns:a16="http://schemas.microsoft.com/office/drawing/2014/main" id="{84EE24CE-E29E-42D5-8830-1673DFE479DB}"/>
+              </a:ext>
+            </a:extLst>
+          </p:cNvPr>
+          <p:cNvCxnSpPr>
+            <a:cxnSpLocks/>
+            <a:stCxn id="54" idx="3"/>
+            <a:endCxn id="69" idx="1"/>
+          </p:cNvCxnSpPr>
+          <p:nvPr/>
+        </p:nvCxnSpPr>
+        <p:spPr>
+          <a:xfrm flipV="1">
+            <a:off x="4374906" y="2378657"/>
+            <a:ext cx="1524720" cy="806"/>
+          </a:xfrm>
+          <a:prstGeom prst="straightConnector1">
+            <a:avLst/>
+          </a:prstGeom>
+          <a:ln w="19050">
+            <a:solidFill>
+              <a:schemeClr val="tx1"/>
+            </a:solidFill>
+            <a:tailEnd type="triangle"/>
+          </a:ln>
+        </p:spPr>
+        <p:style>
+          <a:lnRef idx="1">
+            <a:schemeClr val="accent1"/>
+          </a:lnRef>
+          <a:fillRef idx="0">
+            <a:schemeClr val="accent1"/>
+          </a:fillRef>
+          <a:effectRef idx="0">
+            <a:schemeClr val="accent1"/>
+          </a:effectRef>
+          <a:fontRef idx="minor">
+            <a:schemeClr val="tx1"/>
+          </a:fontRef>
+        </p:style>
+      </p:cxnSp>
+    </p:spTree>
+    <p:extLst>
+      <p:ext uri="{BB962C8B-B14F-4D97-AF65-F5344CB8AC3E}">
+        <p14:creationId xmlns:p14="http://schemas.microsoft.com/office/powerpoint/2010/main" val="2069686145"/>
+      </p:ext>
+    </p:extLst>
+  </p:cSld>
+  <p:clrMapOvr>
+    <a:masterClrMapping/>
+  </p:clrMapOvr>
+</p:sld>
+</file>
+
 <file path=ppt/theme/theme1.xml><?xml version="1.0" encoding="utf-8"?>
 <a:theme xmlns:a="http://schemas.openxmlformats.org/drawingml/2006/main" name="Office Theme">
   <a:themeElements>

</xml_diff>